<commit_message>
Revise material and pptx, add revised. app_sketch.png
</commit_message>
<xml_diff>
--- a/docs/532.pptx
+++ b/docs/532.pptx
@@ -5,9 +5,7 @@
     <p:sldMasterId id="2147483648" r:id="rId1"/>
   </p:sldMasterIdLst>
   <p:sldIdLst>
-    <p:sldId id="256" r:id="rId2"/>
-    <p:sldId id="257" r:id="rId3"/>
-    <p:sldId id="258" r:id="rId4"/>
+    <p:sldId id="260" r:id="rId2"/>
   </p:sldIdLst>
   <p:sldSz cx="12192000" cy="6858000"/>
   <p:notesSz cx="6858000" cy="9144000"/>
@@ -114,6 +112,1977 @@
 </p:presentation>
 </file>
 
+<file path=ppt/charts/chart1.xml><?xml version="1.0" encoding="utf-8"?>
+<c:chartSpace xmlns:c="http://schemas.openxmlformats.org/drawingml/2006/chart" xmlns:a="http://schemas.openxmlformats.org/drawingml/2006/main" xmlns:r="http://schemas.openxmlformats.org/officeDocument/2006/relationships" xmlns:c16r2="http://schemas.microsoft.com/office/drawing/2015/06/chart">
+  <c:date1904 val="0"/>
+  <c:lang val="en-US"/>
+  <c:roundedCorners val="0"/>
+  <mc:AlternateContent xmlns:mc="http://schemas.openxmlformats.org/markup-compatibility/2006">
+    <mc:Choice xmlns:c14="http://schemas.microsoft.com/office/drawing/2007/8/2/chart" Requires="c14">
+      <c14:style val="102"/>
+    </mc:Choice>
+    <mc:Fallback>
+      <c:style val="2"/>
+    </mc:Fallback>
+  </mc:AlternateContent>
+  <c:chart>
+    <c:title>
+      <c:tx>
+        <c:rich>
+          <a:bodyPr rot="0" spcFirstLastPara="1" vertOverflow="ellipsis" vert="horz" wrap="square" anchor="ctr" anchorCtr="1"/>
+          <a:lstStyle/>
+          <a:p>
+            <a:pPr>
+              <a:defRPr sz="1862" b="0" i="0" u="none" strike="noStrike" kern="1200" spc="0" baseline="0">
+                <a:solidFill>
+                  <a:schemeClr val="tx1">
+                    <a:lumMod val="65000"/>
+                    <a:lumOff val="35000"/>
+                  </a:schemeClr>
+                </a:solidFill>
+                <a:latin typeface="Arial Nova Light" panose="020B0304020202020204" pitchFamily="34" charset="0"/>
+                <a:ea typeface="+mn-ea"/>
+                <a:cs typeface="+mn-cs"/>
+              </a:defRPr>
+            </a:pPr>
+            <a:r>
+              <a:rPr lang="en-US"/>
+              <a:t>Financials by studios</a:t>
+            </a:r>
+            <a:endParaRPr lang="en-SG"/>
+          </a:p>
+        </c:rich>
+      </c:tx>
+      <c:layout>
+        <c:manualLayout>
+          <c:xMode val="edge"/>
+          <c:yMode val="edge"/>
+          <c:x val="2.3977366303796908E-2"/>
+          <c:y val="3.0357041837740417E-2"/>
+        </c:manualLayout>
+      </c:layout>
+      <c:overlay val="0"/>
+      <c:spPr>
+        <a:noFill/>
+        <a:ln>
+          <a:noFill/>
+        </a:ln>
+        <a:effectLst/>
+      </c:spPr>
+      <c:txPr>
+        <a:bodyPr rot="0" spcFirstLastPara="1" vertOverflow="ellipsis" vert="horz" wrap="square" anchor="ctr" anchorCtr="1"/>
+        <a:lstStyle/>
+        <a:p>
+          <a:pPr>
+            <a:defRPr sz="1862" b="0" i="0" u="none" strike="noStrike" kern="1200" spc="0" baseline="0">
+              <a:solidFill>
+                <a:schemeClr val="tx1">
+                  <a:lumMod val="65000"/>
+                  <a:lumOff val="35000"/>
+                </a:schemeClr>
+              </a:solidFill>
+              <a:latin typeface="Arial Nova Light" panose="020B0304020202020204" pitchFamily="34" charset="0"/>
+              <a:ea typeface="+mn-ea"/>
+              <a:cs typeface="+mn-cs"/>
+            </a:defRPr>
+          </a:pPr>
+          <a:endParaRPr lang="en-US"/>
+        </a:p>
+      </c:txPr>
+    </c:title>
+    <c:autoTitleDeleted val="0"/>
+    <c:plotArea>
+      <c:layout/>
+      <c:barChart>
+        <c:barDir val="bar"/>
+        <c:grouping val="clustered"/>
+        <c:varyColors val="0"/>
+        <c:ser>
+          <c:idx val="1"/>
+          <c:order val="0"/>
+          <c:tx>
+            <c:strRef>
+              <c:f>Sheet1!$C$1</c:f>
+              <c:strCache>
+                <c:ptCount val="1"/>
+                <c:pt idx="0">
+                  <c:v>Profit</c:v>
+                </c:pt>
+              </c:strCache>
+            </c:strRef>
+          </c:tx>
+          <c:spPr>
+            <a:solidFill>
+              <a:schemeClr val="accent2"/>
+            </a:solidFill>
+            <a:ln>
+              <a:noFill/>
+            </a:ln>
+            <a:effectLst/>
+          </c:spPr>
+          <c:invertIfNegative val="0"/>
+          <c:cat>
+            <c:strRef>
+              <c:f>Sheet1!$A$2:$A$4</c:f>
+              <c:strCache>
+                <c:ptCount val="3"/>
+                <c:pt idx="0">
+                  <c:v>Studio 1</c:v>
+                </c:pt>
+                <c:pt idx="1">
+                  <c:v>Studio 2</c:v>
+                </c:pt>
+                <c:pt idx="2">
+                  <c:v>Studio 3</c:v>
+                </c:pt>
+              </c:strCache>
+            </c:strRef>
+          </c:cat>
+          <c:val>
+            <c:numRef>
+              <c:f>Sheet1!$C$2:$C$4</c:f>
+              <c:numCache>
+                <c:formatCode>General</c:formatCode>
+                <c:ptCount val="3"/>
+                <c:pt idx="0">
+                  <c:v>2.4</c:v>
+                </c:pt>
+                <c:pt idx="1">
+                  <c:v>2.5</c:v>
+                </c:pt>
+                <c:pt idx="2">
+                  <c:v>1.8</c:v>
+                </c:pt>
+              </c:numCache>
+            </c:numRef>
+          </c:val>
+          <c:extLst>
+            <c:ext xmlns:c16="http://schemas.microsoft.com/office/drawing/2014/chart" uri="{C3380CC4-5D6E-409C-BE32-E72D297353CC}">
+              <c16:uniqueId val="{00000001-11A3-4BD7-B4FE-13DE32EFFFA5}"/>
+            </c:ext>
+          </c:extLst>
+        </c:ser>
+        <c:ser>
+          <c:idx val="0"/>
+          <c:order val="1"/>
+          <c:tx>
+            <c:strRef>
+              <c:f>Sheet1!$B$1</c:f>
+              <c:strCache>
+                <c:ptCount val="1"/>
+                <c:pt idx="0">
+                  <c:v>Rev</c:v>
+                </c:pt>
+              </c:strCache>
+            </c:strRef>
+          </c:tx>
+          <c:spPr>
+            <a:solidFill>
+              <a:schemeClr val="accent1"/>
+            </a:solidFill>
+            <a:ln>
+              <a:noFill/>
+            </a:ln>
+            <a:effectLst/>
+          </c:spPr>
+          <c:invertIfNegative val="0"/>
+          <c:cat>
+            <c:strRef>
+              <c:f>Sheet1!$A$2:$A$4</c:f>
+              <c:strCache>
+                <c:ptCount val="3"/>
+                <c:pt idx="0">
+                  <c:v>Studio 1</c:v>
+                </c:pt>
+                <c:pt idx="1">
+                  <c:v>Studio 2</c:v>
+                </c:pt>
+                <c:pt idx="2">
+                  <c:v>Studio 3</c:v>
+                </c:pt>
+              </c:strCache>
+            </c:strRef>
+          </c:cat>
+          <c:val>
+            <c:numRef>
+              <c:f>Sheet1!$B$2:$B$4</c:f>
+              <c:numCache>
+                <c:formatCode>General</c:formatCode>
+                <c:ptCount val="3"/>
+                <c:pt idx="0">
+                  <c:v>4.3</c:v>
+                </c:pt>
+                <c:pt idx="1">
+                  <c:v>4.4000000000000004</c:v>
+                </c:pt>
+                <c:pt idx="2">
+                  <c:v>3.5</c:v>
+                </c:pt>
+              </c:numCache>
+            </c:numRef>
+          </c:val>
+          <c:extLst>
+            <c:ext xmlns:c16="http://schemas.microsoft.com/office/drawing/2014/chart" uri="{C3380CC4-5D6E-409C-BE32-E72D297353CC}">
+              <c16:uniqueId val="{00000000-11A3-4BD7-B4FE-13DE32EFFFA5}"/>
+            </c:ext>
+          </c:extLst>
+        </c:ser>
+        <c:dLbls>
+          <c:showLegendKey val="0"/>
+          <c:showVal val="0"/>
+          <c:showCatName val="0"/>
+          <c:showSerName val="0"/>
+          <c:showPercent val="0"/>
+          <c:showBubbleSize val="0"/>
+        </c:dLbls>
+        <c:gapWidth val="150"/>
+        <c:axId val="500452624"/>
+        <c:axId val="500452952"/>
+      </c:barChart>
+      <c:catAx>
+        <c:axId val="500452624"/>
+        <c:scaling>
+          <c:orientation val="minMax"/>
+        </c:scaling>
+        <c:delete val="0"/>
+        <c:axPos val="l"/>
+        <c:numFmt formatCode="General" sourceLinked="1"/>
+        <c:majorTickMark val="none"/>
+        <c:minorTickMark val="none"/>
+        <c:tickLblPos val="nextTo"/>
+        <c:spPr>
+          <a:noFill/>
+          <a:ln w="9525" cap="flat" cmpd="sng" algn="ctr">
+            <a:solidFill>
+              <a:schemeClr val="tx1">
+                <a:lumMod val="15000"/>
+                <a:lumOff val="85000"/>
+              </a:schemeClr>
+            </a:solidFill>
+            <a:round/>
+          </a:ln>
+          <a:effectLst/>
+        </c:spPr>
+        <c:txPr>
+          <a:bodyPr rot="-60000000" spcFirstLastPara="1" vertOverflow="ellipsis" vert="horz" wrap="square" anchor="ctr" anchorCtr="1"/>
+          <a:lstStyle/>
+          <a:p>
+            <a:pPr>
+              <a:defRPr sz="1197" b="0" i="0" u="none" strike="noStrike" kern="1200" baseline="0">
+                <a:solidFill>
+                  <a:schemeClr val="tx1">
+                    <a:lumMod val="65000"/>
+                    <a:lumOff val="35000"/>
+                  </a:schemeClr>
+                </a:solidFill>
+                <a:latin typeface="Arial Nova Light" panose="020B0304020202020204" pitchFamily="34" charset="0"/>
+                <a:ea typeface="+mn-ea"/>
+                <a:cs typeface="+mn-cs"/>
+              </a:defRPr>
+            </a:pPr>
+            <a:endParaRPr lang="en-US"/>
+          </a:p>
+        </c:txPr>
+        <c:crossAx val="500452952"/>
+        <c:crosses val="autoZero"/>
+        <c:auto val="1"/>
+        <c:lblAlgn val="ctr"/>
+        <c:lblOffset val="100"/>
+        <c:noMultiLvlLbl val="0"/>
+      </c:catAx>
+      <c:valAx>
+        <c:axId val="500452952"/>
+        <c:scaling>
+          <c:orientation val="minMax"/>
+        </c:scaling>
+        <c:delete val="0"/>
+        <c:axPos val="b"/>
+        <c:majorGridlines>
+          <c:spPr>
+            <a:ln w="9525" cap="flat" cmpd="sng" algn="ctr">
+              <a:solidFill>
+                <a:schemeClr val="tx1">
+                  <a:lumMod val="15000"/>
+                  <a:lumOff val="85000"/>
+                </a:schemeClr>
+              </a:solidFill>
+              <a:round/>
+            </a:ln>
+            <a:effectLst/>
+          </c:spPr>
+        </c:majorGridlines>
+        <c:numFmt formatCode="General" sourceLinked="1"/>
+        <c:majorTickMark val="none"/>
+        <c:minorTickMark val="none"/>
+        <c:tickLblPos val="nextTo"/>
+        <c:spPr>
+          <a:noFill/>
+          <a:ln>
+            <a:noFill/>
+          </a:ln>
+          <a:effectLst/>
+        </c:spPr>
+        <c:txPr>
+          <a:bodyPr rot="-60000000" spcFirstLastPara="1" vertOverflow="ellipsis" vert="horz" wrap="square" anchor="ctr" anchorCtr="1"/>
+          <a:lstStyle/>
+          <a:p>
+            <a:pPr>
+              <a:defRPr sz="1197" b="0" i="0" u="none" strike="noStrike" kern="1200" baseline="0">
+                <a:solidFill>
+                  <a:schemeClr val="tx1">
+                    <a:lumMod val="65000"/>
+                    <a:lumOff val="35000"/>
+                  </a:schemeClr>
+                </a:solidFill>
+                <a:latin typeface="Arial Nova Light" panose="020B0304020202020204" pitchFamily="34" charset="0"/>
+                <a:ea typeface="+mn-ea"/>
+                <a:cs typeface="+mn-cs"/>
+              </a:defRPr>
+            </a:pPr>
+            <a:endParaRPr lang="en-US"/>
+          </a:p>
+        </c:txPr>
+        <c:crossAx val="500452624"/>
+        <c:crosses val="autoZero"/>
+        <c:crossBetween val="between"/>
+      </c:valAx>
+      <c:spPr>
+        <a:noFill/>
+        <a:ln>
+          <a:noFill/>
+        </a:ln>
+        <a:effectLst/>
+      </c:spPr>
+    </c:plotArea>
+    <c:legend>
+      <c:legendPos val="b"/>
+      <c:overlay val="0"/>
+      <c:spPr>
+        <a:noFill/>
+        <a:ln>
+          <a:noFill/>
+        </a:ln>
+        <a:effectLst/>
+      </c:spPr>
+      <c:txPr>
+        <a:bodyPr rot="0" spcFirstLastPara="1" vertOverflow="ellipsis" vert="horz" wrap="square" anchor="ctr" anchorCtr="1"/>
+        <a:lstStyle/>
+        <a:p>
+          <a:pPr>
+            <a:defRPr sz="1197" b="0" i="0" u="none" strike="noStrike" kern="1200" baseline="0">
+              <a:solidFill>
+                <a:schemeClr val="tx1">
+                  <a:lumMod val="65000"/>
+                  <a:lumOff val="35000"/>
+                </a:schemeClr>
+              </a:solidFill>
+              <a:latin typeface="Arial Nova Light" panose="020B0304020202020204" pitchFamily="34" charset="0"/>
+              <a:ea typeface="+mn-ea"/>
+              <a:cs typeface="+mn-cs"/>
+            </a:defRPr>
+          </a:pPr>
+          <a:endParaRPr lang="en-US"/>
+        </a:p>
+      </c:txPr>
+    </c:legend>
+    <c:plotVisOnly val="1"/>
+    <c:dispBlanksAs val="gap"/>
+    <c:extLst>
+      <c:ext xmlns:c16r3="http://schemas.microsoft.com/office/drawing/2017/03/chart" uri="{56B9EC1D-385E-4148-901F-78D8002777C0}">
+        <c16r3:dataDisplayOptions16>
+          <c16r3:dispNaAsBlank val="1"/>
+        </c16r3:dataDisplayOptions16>
+      </c:ext>
+    </c:extLst>
+    <c:showDLblsOverMax val="0"/>
+  </c:chart>
+  <c:spPr>
+    <a:noFill/>
+    <a:ln>
+      <a:noFill/>
+    </a:ln>
+    <a:effectLst/>
+  </c:spPr>
+  <c:txPr>
+    <a:bodyPr/>
+    <a:lstStyle/>
+    <a:p>
+      <a:pPr>
+        <a:defRPr>
+          <a:latin typeface="Arial Nova Light" panose="020B0304020202020204" pitchFamily="34" charset="0"/>
+        </a:defRPr>
+      </a:pPr>
+      <a:endParaRPr lang="en-US"/>
+    </a:p>
+  </c:txPr>
+  <c:externalData r:id="rId3">
+    <c:autoUpdate val="0"/>
+  </c:externalData>
+</c:chartSpace>
+</file>
+
+<file path=ppt/charts/chart2.xml><?xml version="1.0" encoding="utf-8"?>
+<c:chartSpace xmlns:c="http://schemas.openxmlformats.org/drawingml/2006/chart" xmlns:a="http://schemas.openxmlformats.org/drawingml/2006/main" xmlns:r="http://schemas.openxmlformats.org/officeDocument/2006/relationships" xmlns:c16r2="http://schemas.microsoft.com/office/drawing/2015/06/chart">
+  <c:date1904 val="0"/>
+  <c:lang val="en-US"/>
+  <c:roundedCorners val="0"/>
+  <mc:AlternateContent xmlns:mc="http://schemas.openxmlformats.org/markup-compatibility/2006">
+    <mc:Choice xmlns:c14="http://schemas.microsoft.com/office/drawing/2007/8/2/chart" Requires="c14">
+      <c14:style val="102"/>
+    </mc:Choice>
+    <mc:Fallback>
+      <c:style val="2"/>
+    </mc:Fallback>
+  </mc:AlternateContent>
+  <c:chart>
+    <c:title>
+      <c:tx>
+        <c:rich>
+          <a:bodyPr rot="0" spcFirstLastPara="1" vertOverflow="ellipsis" vert="horz" wrap="square" anchor="ctr" anchorCtr="1"/>
+          <a:lstStyle/>
+          <a:p>
+            <a:pPr algn="l">
+              <a:defRPr sz="1400" b="0" i="0" u="none" strike="noStrike" kern="1200" spc="0" baseline="0">
+                <a:solidFill>
+                  <a:schemeClr val="tx1">
+                    <a:lumMod val="65000"/>
+                    <a:lumOff val="35000"/>
+                  </a:schemeClr>
+                </a:solidFill>
+                <a:latin typeface="Arial Nova Light" panose="020B0304020202020204" pitchFamily="34" charset="0"/>
+                <a:ea typeface="+mn-ea"/>
+                <a:cs typeface="+mn-cs"/>
+              </a:defRPr>
+            </a:pPr>
+            <a:r>
+              <a:rPr lang="en-US" sz="1400"/>
+              <a:t>[Genre] Movies of [StudioA]</a:t>
+            </a:r>
+          </a:p>
+        </c:rich>
+      </c:tx>
+      <c:layout>
+        <c:manualLayout>
+          <c:xMode val="edge"/>
+          <c:yMode val="edge"/>
+          <c:x val="9.4174814791796735E-3"/>
+          <c:y val="3.4886604799517787E-2"/>
+        </c:manualLayout>
+      </c:layout>
+      <c:overlay val="0"/>
+      <c:spPr>
+        <a:noFill/>
+        <a:ln>
+          <a:noFill/>
+        </a:ln>
+        <a:effectLst/>
+      </c:spPr>
+      <c:txPr>
+        <a:bodyPr rot="0" spcFirstLastPara="1" vertOverflow="ellipsis" vert="horz" wrap="square" anchor="ctr" anchorCtr="1"/>
+        <a:lstStyle/>
+        <a:p>
+          <a:pPr algn="l">
+            <a:defRPr sz="1400" b="0" i="0" u="none" strike="noStrike" kern="1200" spc="0" baseline="0">
+              <a:solidFill>
+                <a:schemeClr val="tx1">
+                  <a:lumMod val="65000"/>
+                  <a:lumOff val="35000"/>
+                </a:schemeClr>
+              </a:solidFill>
+              <a:latin typeface="Arial Nova Light" panose="020B0304020202020204" pitchFamily="34" charset="0"/>
+              <a:ea typeface="+mn-ea"/>
+              <a:cs typeface="+mn-cs"/>
+            </a:defRPr>
+          </a:pPr>
+          <a:endParaRPr lang="en-US"/>
+        </a:p>
+      </c:txPr>
+    </c:title>
+    <c:autoTitleDeleted val="0"/>
+    <c:plotArea>
+      <c:layout>
+        <c:manualLayout>
+          <c:layoutTarget val="inner"/>
+          <c:xMode val="edge"/>
+          <c:yMode val="edge"/>
+          <c:x val="0.2133690429833224"/>
+          <c:y val="0.20316483116296011"/>
+          <c:w val="0.72894491773541514"/>
+          <c:h val="0.56787033955772104"/>
+        </c:manualLayout>
+      </c:layout>
+      <c:scatterChart>
+        <c:scatterStyle val="lineMarker"/>
+        <c:varyColors val="0"/>
+        <c:ser>
+          <c:idx val="0"/>
+          <c:order val="0"/>
+          <c:tx>
+            <c:strRef>
+              <c:f>Sheet1!$B$1</c:f>
+              <c:strCache>
+                <c:ptCount val="1"/>
+                <c:pt idx="0">
+                  <c:v>Vote Average</c:v>
+                </c:pt>
+              </c:strCache>
+            </c:strRef>
+          </c:tx>
+          <c:spPr>
+            <a:ln w="19050" cap="rnd">
+              <a:noFill/>
+              <a:round/>
+            </a:ln>
+            <a:effectLst/>
+          </c:spPr>
+          <c:marker>
+            <c:symbol val="circle"/>
+            <c:size val="5"/>
+            <c:spPr>
+              <a:solidFill>
+                <a:schemeClr val="accent1"/>
+              </a:solidFill>
+              <a:ln w="9525">
+                <a:solidFill>
+                  <a:schemeClr val="accent1"/>
+                </a:solidFill>
+              </a:ln>
+              <a:effectLst/>
+            </c:spPr>
+          </c:marker>
+          <c:xVal>
+            <c:numRef>
+              <c:f>Sheet1!$A$2:$A$4</c:f>
+              <c:numCache>
+                <c:formatCode>General</c:formatCode>
+                <c:ptCount val="3"/>
+                <c:pt idx="0">
+                  <c:v>0.7</c:v>
+                </c:pt>
+                <c:pt idx="1">
+                  <c:v>1.8</c:v>
+                </c:pt>
+                <c:pt idx="2">
+                  <c:v>2.6</c:v>
+                </c:pt>
+              </c:numCache>
+            </c:numRef>
+          </c:xVal>
+          <c:yVal>
+            <c:numRef>
+              <c:f>Sheet1!$B$2:$B$4</c:f>
+              <c:numCache>
+                <c:formatCode>General</c:formatCode>
+                <c:ptCount val="3"/>
+                <c:pt idx="0">
+                  <c:v>2.7</c:v>
+                </c:pt>
+                <c:pt idx="1">
+                  <c:v>3.2</c:v>
+                </c:pt>
+                <c:pt idx="2">
+                  <c:v>0.8</c:v>
+                </c:pt>
+              </c:numCache>
+            </c:numRef>
+          </c:yVal>
+          <c:smooth val="0"/>
+          <c:extLst>
+            <c:ext xmlns:c16="http://schemas.microsoft.com/office/drawing/2014/chart" uri="{C3380CC4-5D6E-409C-BE32-E72D297353CC}">
+              <c16:uniqueId val="{00000000-E23D-423D-A68C-9510BC6536D8}"/>
+            </c:ext>
+          </c:extLst>
+        </c:ser>
+        <c:dLbls>
+          <c:showLegendKey val="0"/>
+          <c:showVal val="0"/>
+          <c:showCatName val="0"/>
+          <c:showSerName val="0"/>
+          <c:showPercent val="0"/>
+          <c:showBubbleSize val="0"/>
+        </c:dLbls>
+        <c:axId val="500465416"/>
+        <c:axId val="500465744"/>
+      </c:scatterChart>
+      <c:valAx>
+        <c:axId val="500465416"/>
+        <c:scaling>
+          <c:orientation val="minMax"/>
+        </c:scaling>
+        <c:delete val="0"/>
+        <c:axPos val="b"/>
+        <c:majorGridlines>
+          <c:spPr>
+            <a:ln w="9525" cap="flat" cmpd="sng" algn="ctr">
+              <a:solidFill>
+                <a:schemeClr val="tx1">
+                  <a:lumMod val="15000"/>
+                  <a:lumOff val="85000"/>
+                </a:schemeClr>
+              </a:solidFill>
+              <a:round/>
+            </a:ln>
+            <a:effectLst/>
+          </c:spPr>
+        </c:majorGridlines>
+        <c:title>
+          <c:tx>
+            <c:rich>
+              <a:bodyPr rot="0" spcFirstLastPara="1" vertOverflow="ellipsis" vert="horz" wrap="square" anchor="ctr" anchorCtr="1"/>
+              <a:lstStyle/>
+              <a:p>
+                <a:pPr>
+                  <a:defRPr sz="1330" b="0" i="0" u="none" strike="noStrike" kern="1200" baseline="0">
+                    <a:solidFill>
+                      <a:schemeClr val="tx1">
+                        <a:lumMod val="65000"/>
+                        <a:lumOff val="35000"/>
+                      </a:schemeClr>
+                    </a:solidFill>
+                    <a:latin typeface="Arial Nova Light" panose="020B0304020202020204" pitchFamily="34" charset="0"/>
+                    <a:ea typeface="+mn-ea"/>
+                    <a:cs typeface="+mn-cs"/>
+                  </a:defRPr>
+                </a:pPr>
+                <a:r>
+                  <a:rPr lang="en-SG"/>
+                  <a:t>Vote Count</a:t>
+                </a:r>
+              </a:p>
+            </c:rich>
+          </c:tx>
+          <c:overlay val="0"/>
+          <c:spPr>
+            <a:noFill/>
+            <a:ln>
+              <a:noFill/>
+            </a:ln>
+            <a:effectLst/>
+          </c:spPr>
+          <c:txPr>
+            <a:bodyPr rot="0" spcFirstLastPara="1" vertOverflow="ellipsis" vert="horz" wrap="square" anchor="ctr" anchorCtr="1"/>
+            <a:lstStyle/>
+            <a:p>
+              <a:pPr>
+                <a:defRPr sz="1330" b="0" i="0" u="none" strike="noStrike" kern="1200" baseline="0">
+                  <a:solidFill>
+                    <a:schemeClr val="tx1">
+                      <a:lumMod val="65000"/>
+                      <a:lumOff val="35000"/>
+                    </a:schemeClr>
+                  </a:solidFill>
+                  <a:latin typeface="Arial Nova Light" panose="020B0304020202020204" pitchFamily="34" charset="0"/>
+                  <a:ea typeface="+mn-ea"/>
+                  <a:cs typeface="+mn-cs"/>
+                </a:defRPr>
+              </a:pPr>
+              <a:endParaRPr lang="en-US"/>
+            </a:p>
+          </c:txPr>
+        </c:title>
+        <c:numFmt formatCode="General" sourceLinked="1"/>
+        <c:majorTickMark val="none"/>
+        <c:minorTickMark val="none"/>
+        <c:tickLblPos val="nextTo"/>
+        <c:spPr>
+          <a:noFill/>
+          <a:ln w="9525" cap="flat" cmpd="sng" algn="ctr">
+            <a:solidFill>
+              <a:schemeClr val="tx1">
+                <a:lumMod val="25000"/>
+                <a:lumOff val="75000"/>
+              </a:schemeClr>
+            </a:solidFill>
+            <a:round/>
+          </a:ln>
+          <a:effectLst/>
+        </c:spPr>
+        <c:txPr>
+          <a:bodyPr rot="-60000000" spcFirstLastPara="1" vertOverflow="ellipsis" vert="horz" wrap="square" anchor="ctr" anchorCtr="1"/>
+          <a:lstStyle/>
+          <a:p>
+            <a:pPr>
+              <a:defRPr sz="1197" b="0" i="0" u="none" strike="noStrike" kern="1200" baseline="0">
+                <a:solidFill>
+                  <a:schemeClr val="tx1">
+                    <a:lumMod val="65000"/>
+                    <a:lumOff val="35000"/>
+                  </a:schemeClr>
+                </a:solidFill>
+                <a:latin typeface="Arial Nova Light" panose="020B0304020202020204" pitchFamily="34" charset="0"/>
+                <a:ea typeface="+mn-ea"/>
+                <a:cs typeface="+mn-cs"/>
+              </a:defRPr>
+            </a:pPr>
+            <a:endParaRPr lang="en-US"/>
+          </a:p>
+        </c:txPr>
+        <c:crossAx val="500465744"/>
+        <c:crosses val="autoZero"/>
+        <c:crossBetween val="midCat"/>
+      </c:valAx>
+      <c:valAx>
+        <c:axId val="500465744"/>
+        <c:scaling>
+          <c:orientation val="minMax"/>
+        </c:scaling>
+        <c:delete val="0"/>
+        <c:axPos val="l"/>
+        <c:majorGridlines>
+          <c:spPr>
+            <a:ln w="9525" cap="flat" cmpd="sng" algn="ctr">
+              <a:solidFill>
+                <a:schemeClr val="tx1">
+                  <a:lumMod val="15000"/>
+                  <a:lumOff val="85000"/>
+                </a:schemeClr>
+              </a:solidFill>
+              <a:round/>
+            </a:ln>
+            <a:effectLst/>
+          </c:spPr>
+        </c:majorGridlines>
+        <c:title>
+          <c:tx>
+            <c:rich>
+              <a:bodyPr rot="-5400000" spcFirstLastPara="1" vertOverflow="ellipsis" vert="horz" wrap="square" anchor="ctr" anchorCtr="1"/>
+              <a:lstStyle/>
+              <a:p>
+                <a:pPr>
+                  <a:defRPr sz="1330" b="0" i="0" u="none" strike="noStrike" kern="1200" baseline="0">
+                    <a:solidFill>
+                      <a:schemeClr val="tx1">
+                        <a:lumMod val="65000"/>
+                        <a:lumOff val="35000"/>
+                      </a:schemeClr>
+                    </a:solidFill>
+                    <a:latin typeface="Arial Nova Light" panose="020B0304020202020204" pitchFamily="34" charset="0"/>
+                    <a:ea typeface="+mn-ea"/>
+                    <a:cs typeface="+mn-cs"/>
+                  </a:defRPr>
+                </a:pPr>
+                <a:r>
+                  <a:rPr lang="en-SG"/>
+                  <a:t>Vote Average</a:t>
+                </a:r>
+              </a:p>
+            </c:rich>
+          </c:tx>
+          <c:overlay val="0"/>
+          <c:spPr>
+            <a:noFill/>
+            <a:ln>
+              <a:noFill/>
+            </a:ln>
+            <a:effectLst/>
+          </c:spPr>
+          <c:txPr>
+            <a:bodyPr rot="-5400000" spcFirstLastPara="1" vertOverflow="ellipsis" vert="horz" wrap="square" anchor="ctr" anchorCtr="1"/>
+            <a:lstStyle/>
+            <a:p>
+              <a:pPr>
+                <a:defRPr sz="1330" b="0" i="0" u="none" strike="noStrike" kern="1200" baseline="0">
+                  <a:solidFill>
+                    <a:schemeClr val="tx1">
+                      <a:lumMod val="65000"/>
+                      <a:lumOff val="35000"/>
+                    </a:schemeClr>
+                  </a:solidFill>
+                  <a:latin typeface="Arial Nova Light" panose="020B0304020202020204" pitchFamily="34" charset="0"/>
+                  <a:ea typeface="+mn-ea"/>
+                  <a:cs typeface="+mn-cs"/>
+                </a:defRPr>
+              </a:pPr>
+              <a:endParaRPr lang="en-US"/>
+            </a:p>
+          </c:txPr>
+        </c:title>
+        <c:numFmt formatCode="General" sourceLinked="1"/>
+        <c:majorTickMark val="none"/>
+        <c:minorTickMark val="none"/>
+        <c:tickLblPos val="nextTo"/>
+        <c:spPr>
+          <a:noFill/>
+          <a:ln w="9525" cap="flat" cmpd="sng" algn="ctr">
+            <a:solidFill>
+              <a:schemeClr val="tx1">
+                <a:lumMod val="25000"/>
+                <a:lumOff val="75000"/>
+              </a:schemeClr>
+            </a:solidFill>
+            <a:round/>
+          </a:ln>
+          <a:effectLst/>
+        </c:spPr>
+        <c:txPr>
+          <a:bodyPr rot="-60000000" spcFirstLastPara="1" vertOverflow="ellipsis" vert="horz" wrap="square" anchor="ctr" anchorCtr="1"/>
+          <a:lstStyle/>
+          <a:p>
+            <a:pPr>
+              <a:defRPr sz="1197" b="0" i="0" u="none" strike="noStrike" kern="1200" baseline="0">
+                <a:solidFill>
+                  <a:schemeClr val="tx1">
+                    <a:lumMod val="65000"/>
+                    <a:lumOff val="35000"/>
+                  </a:schemeClr>
+                </a:solidFill>
+                <a:latin typeface="Arial Nova Light" panose="020B0304020202020204" pitchFamily="34" charset="0"/>
+                <a:ea typeface="+mn-ea"/>
+                <a:cs typeface="+mn-cs"/>
+              </a:defRPr>
+            </a:pPr>
+            <a:endParaRPr lang="en-US"/>
+          </a:p>
+        </c:txPr>
+        <c:crossAx val="500465416"/>
+        <c:crosses val="autoZero"/>
+        <c:crossBetween val="midCat"/>
+      </c:valAx>
+      <c:spPr>
+        <a:noFill/>
+        <a:ln>
+          <a:noFill/>
+        </a:ln>
+        <a:effectLst/>
+      </c:spPr>
+    </c:plotArea>
+    <c:plotVisOnly val="1"/>
+    <c:dispBlanksAs val="gap"/>
+    <c:extLst>
+      <c:ext xmlns:c16r3="http://schemas.microsoft.com/office/drawing/2017/03/chart" uri="{56B9EC1D-385E-4148-901F-78D8002777C0}">
+        <c16r3:dataDisplayOptions16>
+          <c16r3:dispNaAsBlank val="1"/>
+        </c16r3:dataDisplayOptions16>
+      </c:ext>
+    </c:extLst>
+    <c:showDLblsOverMax val="0"/>
+  </c:chart>
+  <c:spPr>
+    <a:noFill/>
+    <a:ln>
+      <a:noFill/>
+    </a:ln>
+    <a:effectLst/>
+  </c:spPr>
+  <c:txPr>
+    <a:bodyPr/>
+    <a:lstStyle/>
+    <a:p>
+      <a:pPr>
+        <a:defRPr>
+          <a:latin typeface="Arial Nova Light" panose="020B0304020202020204" pitchFamily="34" charset="0"/>
+        </a:defRPr>
+      </a:pPr>
+      <a:endParaRPr lang="en-US"/>
+    </a:p>
+  </c:txPr>
+  <c:externalData r:id="rId3">
+    <c:autoUpdate val="0"/>
+  </c:externalData>
+</c:chartSpace>
+</file>
+
+<file path=ppt/charts/colors1.xml><?xml version="1.0" encoding="utf-8"?>
+<cs:colorStyle xmlns:cs="http://schemas.microsoft.com/office/drawing/2012/chartStyle" xmlns:a="http://schemas.openxmlformats.org/drawingml/2006/main" meth="cycle" id="10">
+  <a:schemeClr val="accent1"/>
+  <a:schemeClr val="accent2"/>
+  <a:schemeClr val="accent3"/>
+  <a:schemeClr val="accent4"/>
+  <a:schemeClr val="accent5"/>
+  <a:schemeClr val="accent6"/>
+  <cs:variation/>
+  <cs:variation>
+    <a:lumMod val="60000"/>
+  </cs:variation>
+  <cs:variation>
+    <a:lumMod val="80000"/>
+    <a:lumOff val="20000"/>
+  </cs:variation>
+  <cs:variation>
+    <a:lumMod val="80000"/>
+  </cs:variation>
+  <cs:variation>
+    <a:lumMod val="60000"/>
+    <a:lumOff val="40000"/>
+  </cs:variation>
+  <cs:variation>
+    <a:lumMod val="50000"/>
+  </cs:variation>
+  <cs:variation>
+    <a:lumMod val="70000"/>
+    <a:lumOff val="30000"/>
+  </cs:variation>
+  <cs:variation>
+    <a:lumMod val="70000"/>
+  </cs:variation>
+  <cs:variation>
+    <a:lumMod val="50000"/>
+    <a:lumOff val="50000"/>
+  </cs:variation>
+</cs:colorStyle>
+</file>
+
+<file path=ppt/charts/colors2.xml><?xml version="1.0" encoding="utf-8"?>
+<cs:colorStyle xmlns:cs="http://schemas.microsoft.com/office/drawing/2012/chartStyle" xmlns:a="http://schemas.openxmlformats.org/drawingml/2006/main" meth="cycle" id="10">
+  <a:schemeClr val="accent1"/>
+  <a:schemeClr val="accent2"/>
+  <a:schemeClr val="accent3"/>
+  <a:schemeClr val="accent4"/>
+  <a:schemeClr val="accent5"/>
+  <a:schemeClr val="accent6"/>
+  <cs:variation/>
+  <cs:variation>
+    <a:lumMod val="60000"/>
+  </cs:variation>
+  <cs:variation>
+    <a:lumMod val="80000"/>
+    <a:lumOff val="20000"/>
+  </cs:variation>
+  <cs:variation>
+    <a:lumMod val="80000"/>
+  </cs:variation>
+  <cs:variation>
+    <a:lumMod val="60000"/>
+    <a:lumOff val="40000"/>
+  </cs:variation>
+  <cs:variation>
+    <a:lumMod val="50000"/>
+  </cs:variation>
+  <cs:variation>
+    <a:lumMod val="70000"/>
+    <a:lumOff val="30000"/>
+  </cs:variation>
+  <cs:variation>
+    <a:lumMod val="70000"/>
+  </cs:variation>
+  <cs:variation>
+    <a:lumMod val="50000"/>
+    <a:lumOff val="50000"/>
+  </cs:variation>
+</cs:colorStyle>
+</file>
+
+<file path=ppt/charts/style1.xml><?xml version="1.0" encoding="utf-8"?>
+<cs:chartStyle xmlns:cs="http://schemas.microsoft.com/office/drawing/2012/chartStyle" xmlns:a="http://schemas.openxmlformats.org/drawingml/2006/main" id="297">
+  <cs:axisTitle>
+    <cs:lnRef idx="0"/>
+    <cs:fillRef idx="0"/>
+    <cs:effectRef idx="0"/>
+    <cs:fontRef idx="minor">
+      <a:schemeClr val="tx1">
+        <a:lumMod val="65000"/>
+        <a:lumOff val="35000"/>
+      </a:schemeClr>
+    </cs:fontRef>
+    <cs:defRPr sz="1330" kern="1200"/>
+  </cs:axisTitle>
+  <cs:categoryAxis>
+    <cs:lnRef idx="0"/>
+    <cs:fillRef idx="0"/>
+    <cs:effectRef idx="0"/>
+    <cs:fontRef idx="minor">
+      <a:schemeClr val="tx1">
+        <a:lumMod val="65000"/>
+        <a:lumOff val="35000"/>
+      </a:schemeClr>
+    </cs:fontRef>
+    <cs:spPr>
+      <a:ln w="9525" cap="flat" cmpd="sng" algn="ctr">
+        <a:solidFill>
+          <a:schemeClr val="tx1">
+            <a:lumMod val="15000"/>
+            <a:lumOff val="85000"/>
+          </a:schemeClr>
+        </a:solidFill>
+        <a:round/>
+      </a:ln>
+    </cs:spPr>
+    <cs:defRPr sz="1197" kern="1200"/>
+  </cs:categoryAxis>
+  <cs:chartArea mods="allowNoFillOverride allowNoLineOverride">
+    <cs:lnRef idx="0"/>
+    <cs:fillRef idx="0"/>
+    <cs:effectRef idx="0"/>
+    <cs:fontRef idx="minor">
+      <a:schemeClr val="tx1"/>
+    </cs:fontRef>
+    <cs:spPr>
+      <a:solidFill>
+        <a:schemeClr val="bg1"/>
+      </a:solidFill>
+      <a:ln w="9525" cap="flat" cmpd="sng" algn="ctr">
+        <a:solidFill>
+          <a:schemeClr val="tx1">
+            <a:lumMod val="15000"/>
+            <a:lumOff val="85000"/>
+          </a:schemeClr>
+        </a:solidFill>
+        <a:round/>
+      </a:ln>
+    </cs:spPr>
+    <cs:defRPr sz="1330" kern="1200"/>
+  </cs:chartArea>
+  <cs:dataLabel>
+    <cs:lnRef idx="0"/>
+    <cs:fillRef idx="0"/>
+    <cs:effectRef idx="0"/>
+    <cs:fontRef idx="minor">
+      <a:schemeClr val="tx1">
+        <a:lumMod val="75000"/>
+        <a:lumOff val="25000"/>
+      </a:schemeClr>
+    </cs:fontRef>
+    <cs:defRPr sz="1197" kern="1200"/>
+  </cs:dataLabel>
+  <cs:dataLabelCallout>
+    <cs:lnRef idx="0"/>
+    <cs:fillRef idx="0"/>
+    <cs:effectRef idx="0"/>
+    <cs:fontRef idx="minor">
+      <a:schemeClr val="dk1">
+        <a:lumMod val="65000"/>
+        <a:lumOff val="35000"/>
+      </a:schemeClr>
+    </cs:fontRef>
+    <cs:spPr>
+      <a:solidFill>
+        <a:schemeClr val="lt1"/>
+      </a:solidFill>
+      <a:ln>
+        <a:solidFill>
+          <a:schemeClr val="dk1">
+            <a:lumMod val="25000"/>
+            <a:lumOff val="75000"/>
+          </a:schemeClr>
+        </a:solidFill>
+      </a:ln>
+    </cs:spPr>
+    <cs:defRPr sz="1197" kern="1200"/>
+    <cs:bodyPr rot="0" spcFirstLastPara="1" vertOverflow="clip" horzOverflow="clip" vert="horz" wrap="square" lIns="36576" tIns="18288" rIns="36576" bIns="18288" anchor="ctr" anchorCtr="1">
+      <a:spAutoFit/>
+    </cs:bodyPr>
+  </cs:dataLabelCallout>
+  <cs:dataPoint>
+    <cs:lnRef idx="0"/>
+    <cs:fillRef idx="1">
+      <cs:styleClr val="auto"/>
+    </cs:fillRef>
+    <cs:effectRef idx="0"/>
+    <cs:fontRef idx="minor">
+      <a:schemeClr val="tx1"/>
+    </cs:fontRef>
+  </cs:dataPoint>
+  <cs:dataPoint3D>
+    <cs:lnRef idx="0"/>
+    <cs:fillRef idx="1">
+      <cs:styleClr val="auto"/>
+    </cs:fillRef>
+    <cs:effectRef idx="0"/>
+    <cs:fontRef idx="minor">
+      <a:schemeClr val="tx1"/>
+    </cs:fontRef>
+  </cs:dataPoint3D>
+  <cs:dataPointLine>
+    <cs:lnRef idx="0">
+      <cs:styleClr val="auto"/>
+    </cs:lnRef>
+    <cs:fillRef idx="1"/>
+    <cs:effectRef idx="0"/>
+    <cs:fontRef idx="minor">
+      <a:schemeClr val="tx1"/>
+    </cs:fontRef>
+    <cs:spPr>
+      <a:ln w="28575" cap="rnd">
+        <a:solidFill>
+          <a:schemeClr val="phClr"/>
+        </a:solidFill>
+        <a:round/>
+      </a:ln>
+    </cs:spPr>
+  </cs:dataPointLine>
+  <cs:dataPointMarker>
+    <cs:lnRef idx="0">
+      <cs:styleClr val="auto"/>
+    </cs:lnRef>
+    <cs:fillRef idx="1">
+      <cs:styleClr val="auto"/>
+    </cs:fillRef>
+    <cs:effectRef idx="0"/>
+    <cs:fontRef idx="minor">
+      <a:schemeClr val="tx1"/>
+    </cs:fontRef>
+    <cs:spPr>
+      <a:ln w="9525">
+        <a:solidFill>
+          <a:schemeClr val="phClr"/>
+        </a:solidFill>
+      </a:ln>
+    </cs:spPr>
+  </cs:dataPointMarker>
+  <cs:dataPointMarkerLayout symbol="circle" size="5"/>
+  <cs:dataPointWireframe>
+    <cs:lnRef idx="0">
+      <cs:styleClr val="auto"/>
+    </cs:lnRef>
+    <cs:fillRef idx="1"/>
+    <cs:effectRef idx="0"/>
+    <cs:fontRef idx="minor">
+      <a:schemeClr val="tx1"/>
+    </cs:fontRef>
+    <cs:spPr>
+      <a:ln w="9525" cap="rnd">
+        <a:solidFill>
+          <a:schemeClr val="phClr"/>
+        </a:solidFill>
+        <a:round/>
+      </a:ln>
+    </cs:spPr>
+  </cs:dataPointWireframe>
+  <cs:dataTable>
+    <cs:lnRef idx="0"/>
+    <cs:fillRef idx="0"/>
+    <cs:effectRef idx="0"/>
+    <cs:fontRef idx="minor">
+      <a:schemeClr val="tx1">
+        <a:lumMod val="65000"/>
+        <a:lumOff val="35000"/>
+      </a:schemeClr>
+    </cs:fontRef>
+    <cs:spPr>
+      <a:noFill/>
+      <a:ln w="9525" cap="flat" cmpd="sng" algn="ctr">
+        <a:solidFill>
+          <a:schemeClr val="tx1">
+            <a:lumMod val="15000"/>
+            <a:lumOff val="85000"/>
+          </a:schemeClr>
+        </a:solidFill>
+        <a:round/>
+      </a:ln>
+    </cs:spPr>
+    <cs:defRPr sz="1197" kern="1200"/>
+  </cs:dataTable>
+  <cs:downBar>
+    <cs:lnRef idx="0"/>
+    <cs:fillRef idx="0"/>
+    <cs:effectRef idx="0"/>
+    <cs:fontRef idx="minor">
+      <a:schemeClr val="tx1"/>
+    </cs:fontRef>
+    <cs:spPr>
+      <a:solidFill>
+        <a:schemeClr val="dk1">
+          <a:lumMod val="75000"/>
+          <a:lumOff val="25000"/>
+        </a:schemeClr>
+      </a:solidFill>
+      <a:ln w="9525" cap="flat" cmpd="sng" algn="ctr">
+        <a:solidFill>
+          <a:schemeClr val="tx1">
+            <a:lumMod val="65000"/>
+            <a:lumOff val="35000"/>
+          </a:schemeClr>
+        </a:solidFill>
+        <a:round/>
+      </a:ln>
+    </cs:spPr>
+  </cs:downBar>
+  <cs:dropLine>
+    <cs:lnRef idx="0"/>
+    <cs:fillRef idx="0"/>
+    <cs:effectRef idx="0"/>
+    <cs:fontRef idx="minor">
+      <a:schemeClr val="tx1"/>
+    </cs:fontRef>
+    <cs:spPr>
+      <a:ln w="9525" cap="flat" cmpd="sng" algn="ctr">
+        <a:solidFill>
+          <a:schemeClr val="tx1">
+            <a:lumMod val="35000"/>
+            <a:lumOff val="65000"/>
+          </a:schemeClr>
+        </a:solidFill>
+        <a:round/>
+      </a:ln>
+    </cs:spPr>
+  </cs:dropLine>
+  <cs:errorBar>
+    <cs:lnRef idx="0"/>
+    <cs:fillRef idx="0"/>
+    <cs:effectRef idx="0"/>
+    <cs:fontRef idx="minor">
+      <a:schemeClr val="tx1"/>
+    </cs:fontRef>
+    <cs:spPr>
+      <a:ln w="9525" cap="flat" cmpd="sng" algn="ctr">
+        <a:solidFill>
+          <a:schemeClr val="tx1">
+            <a:lumMod val="65000"/>
+            <a:lumOff val="35000"/>
+          </a:schemeClr>
+        </a:solidFill>
+        <a:round/>
+      </a:ln>
+    </cs:spPr>
+  </cs:errorBar>
+  <cs:floor>
+    <cs:lnRef idx="0"/>
+    <cs:fillRef idx="0"/>
+    <cs:effectRef idx="0"/>
+    <cs:fontRef idx="minor">
+      <a:schemeClr val="tx1"/>
+    </cs:fontRef>
+    <cs:spPr>
+      <a:noFill/>
+      <a:ln>
+        <a:noFill/>
+      </a:ln>
+    </cs:spPr>
+  </cs:floor>
+  <cs:gridlineMajor>
+    <cs:lnRef idx="0"/>
+    <cs:fillRef idx="0"/>
+    <cs:effectRef idx="0"/>
+    <cs:fontRef idx="minor">
+      <a:schemeClr val="tx1"/>
+    </cs:fontRef>
+    <cs:spPr>
+      <a:ln w="9525" cap="flat" cmpd="sng" algn="ctr">
+        <a:solidFill>
+          <a:schemeClr val="tx1">
+            <a:lumMod val="15000"/>
+            <a:lumOff val="85000"/>
+          </a:schemeClr>
+        </a:solidFill>
+        <a:round/>
+      </a:ln>
+    </cs:spPr>
+  </cs:gridlineMajor>
+  <cs:gridlineMinor>
+    <cs:lnRef idx="0"/>
+    <cs:fillRef idx="0"/>
+    <cs:effectRef idx="0"/>
+    <cs:fontRef idx="minor">
+      <a:schemeClr val="tx1"/>
+    </cs:fontRef>
+    <cs:spPr>
+      <a:ln w="9525" cap="flat" cmpd="sng" algn="ctr">
+        <a:solidFill>
+          <a:schemeClr val="tx1">
+            <a:lumMod val="5000"/>
+            <a:lumOff val="95000"/>
+          </a:schemeClr>
+        </a:solidFill>
+        <a:round/>
+      </a:ln>
+    </cs:spPr>
+  </cs:gridlineMinor>
+  <cs:hiLoLine>
+    <cs:lnRef idx="0"/>
+    <cs:fillRef idx="0"/>
+    <cs:effectRef idx="0"/>
+    <cs:fontRef idx="minor">
+      <a:schemeClr val="tx1"/>
+    </cs:fontRef>
+    <cs:spPr>
+      <a:ln w="9525" cap="flat" cmpd="sng" algn="ctr">
+        <a:solidFill>
+          <a:schemeClr val="tx1">
+            <a:lumMod val="50000"/>
+            <a:lumOff val="50000"/>
+          </a:schemeClr>
+        </a:solidFill>
+        <a:round/>
+      </a:ln>
+    </cs:spPr>
+  </cs:hiLoLine>
+  <cs:leaderLine>
+    <cs:lnRef idx="0"/>
+    <cs:fillRef idx="0"/>
+    <cs:effectRef idx="0"/>
+    <cs:fontRef idx="minor">
+      <a:schemeClr val="tx1"/>
+    </cs:fontRef>
+    <cs:spPr>
+      <a:ln w="9525" cap="flat" cmpd="sng" algn="ctr">
+        <a:solidFill>
+          <a:schemeClr val="tx1">
+            <a:lumMod val="35000"/>
+            <a:lumOff val="65000"/>
+          </a:schemeClr>
+        </a:solidFill>
+        <a:round/>
+      </a:ln>
+    </cs:spPr>
+  </cs:leaderLine>
+  <cs:legend>
+    <cs:lnRef idx="0"/>
+    <cs:fillRef idx="0"/>
+    <cs:effectRef idx="0"/>
+    <cs:fontRef idx="minor">
+      <a:schemeClr val="tx1">
+        <a:lumMod val="65000"/>
+        <a:lumOff val="35000"/>
+      </a:schemeClr>
+    </cs:fontRef>
+    <cs:defRPr sz="1197" kern="1200"/>
+  </cs:legend>
+  <cs:plotArea mods="allowNoFillOverride allowNoLineOverride">
+    <cs:lnRef idx="0"/>
+    <cs:fillRef idx="0"/>
+    <cs:effectRef idx="0"/>
+    <cs:fontRef idx="minor">
+      <a:schemeClr val="tx1"/>
+    </cs:fontRef>
+  </cs:plotArea>
+  <cs:plotArea3D mods="allowNoFillOverride allowNoLineOverride">
+    <cs:lnRef idx="0"/>
+    <cs:fillRef idx="0"/>
+    <cs:effectRef idx="0"/>
+    <cs:fontRef idx="minor">
+      <a:schemeClr val="tx1"/>
+    </cs:fontRef>
+  </cs:plotArea3D>
+  <cs:seriesAxis>
+    <cs:lnRef idx="0"/>
+    <cs:fillRef idx="0"/>
+    <cs:effectRef idx="0"/>
+    <cs:fontRef idx="minor">
+      <a:schemeClr val="tx1">
+        <a:lumMod val="65000"/>
+        <a:lumOff val="35000"/>
+      </a:schemeClr>
+    </cs:fontRef>
+    <cs:defRPr sz="1197" kern="1200"/>
+  </cs:seriesAxis>
+  <cs:seriesLine>
+    <cs:lnRef idx="0"/>
+    <cs:fillRef idx="0"/>
+    <cs:effectRef idx="0"/>
+    <cs:fontRef idx="minor">
+      <a:schemeClr val="tx1"/>
+    </cs:fontRef>
+    <cs:spPr>
+      <a:ln w="9525" cap="flat" cmpd="sng" algn="ctr">
+        <a:solidFill>
+          <a:schemeClr val="tx1">
+            <a:lumMod val="35000"/>
+            <a:lumOff val="65000"/>
+          </a:schemeClr>
+        </a:solidFill>
+        <a:round/>
+      </a:ln>
+    </cs:spPr>
+  </cs:seriesLine>
+  <cs:title>
+    <cs:lnRef idx="0"/>
+    <cs:fillRef idx="0"/>
+    <cs:effectRef idx="0"/>
+    <cs:fontRef idx="minor">
+      <a:schemeClr val="tx1">
+        <a:lumMod val="65000"/>
+        <a:lumOff val="35000"/>
+      </a:schemeClr>
+    </cs:fontRef>
+    <cs:defRPr sz="1862" b="0" kern="1200" spc="0" baseline="0"/>
+  </cs:title>
+  <cs:trendline>
+    <cs:lnRef idx="0">
+      <cs:styleClr val="auto"/>
+    </cs:lnRef>
+    <cs:fillRef idx="0"/>
+    <cs:effectRef idx="0"/>
+    <cs:fontRef idx="minor">
+      <a:schemeClr val="tx1"/>
+    </cs:fontRef>
+    <cs:spPr>
+      <a:ln w="19050" cap="rnd">
+        <a:solidFill>
+          <a:schemeClr val="phClr"/>
+        </a:solidFill>
+        <a:prstDash val="sysDot"/>
+      </a:ln>
+    </cs:spPr>
+  </cs:trendline>
+  <cs:trendlineLabel>
+    <cs:lnRef idx="0"/>
+    <cs:fillRef idx="0"/>
+    <cs:effectRef idx="0"/>
+    <cs:fontRef idx="minor">
+      <a:schemeClr val="tx1">
+        <a:lumMod val="65000"/>
+        <a:lumOff val="35000"/>
+      </a:schemeClr>
+    </cs:fontRef>
+    <cs:defRPr sz="1197" kern="1200"/>
+  </cs:trendlineLabel>
+  <cs:upBar>
+    <cs:lnRef idx="0"/>
+    <cs:fillRef idx="0"/>
+    <cs:effectRef idx="0"/>
+    <cs:fontRef idx="minor">
+      <a:schemeClr val="tx1"/>
+    </cs:fontRef>
+    <cs:spPr>
+      <a:solidFill>
+        <a:schemeClr val="lt1"/>
+      </a:solidFill>
+      <a:ln w="9525" cap="flat" cmpd="sng" algn="ctr">
+        <a:solidFill>
+          <a:schemeClr val="tx1">
+            <a:lumMod val="65000"/>
+            <a:lumOff val="35000"/>
+          </a:schemeClr>
+        </a:solidFill>
+        <a:round/>
+      </a:ln>
+    </cs:spPr>
+  </cs:upBar>
+  <cs:valueAxis>
+    <cs:lnRef idx="0"/>
+    <cs:fillRef idx="0"/>
+    <cs:effectRef idx="0"/>
+    <cs:fontRef idx="minor">
+      <a:schemeClr val="tx1">
+        <a:lumMod val="65000"/>
+        <a:lumOff val="35000"/>
+      </a:schemeClr>
+    </cs:fontRef>
+    <cs:defRPr sz="1197" kern="1200"/>
+  </cs:valueAxis>
+  <cs:wall>
+    <cs:lnRef idx="0"/>
+    <cs:fillRef idx="0"/>
+    <cs:effectRef idx="0"/>
+    <cs:fontRef idx="minor">
+      <a:schemeClr val="tx1"/>
+    </cs:fontRef>
+    <cs:spPr>
+      <a:noFill/>
+      <a:ln>
+        <a:noFill/>
+      </a:ln>
+    </cs:spPr>
+  </cs:wall>
+</cs:chartStyle>
+</file>
+
+<file path=ppt/charts/style2.xml><?xml version="1.0" encoding="utf-8"?>
+<cs:chartStyle xmlns:cs="http://schemas.microsoft.com/office/drawing/2012/chartStyle" xmlns:a="http://schemas.openxmlformats.org/drawingml/2006/main" id="240">
+  <cs:axisTitle>
+    <cs:lnRef idx="0"/>
+    <cs:fillRef idx="0"/>
+    <cs:effectRef idx="0"/>
+    <cs:fontRef idx="minor">
+      <a:schemeClr val="tx1">
+        <a:lumMod val="65000"/>
+        <a:lumOff val="35000"/>
+      </a:schemeClr>
+    </cs:fontRef>
+    <cs:defRPr sz="1330" kern="1200"/>
+  </cs:axisTitle>
+  <cs:categoryAxis>
+    <cs:lnRef idx="0"/>
+    <cs:fillRef idx="0"/>
+    <cs:effectRef idx="0"/>
+    <cs:fontRef idx="minor">
+      <a:schemeClr val="tx1">
+        <a:lumMod val="65000"/>
+        <a:lumOff val="35000"/>
+      </a:schemeClr>
+    </cs:fontRef>
+    <cs:spPr>
+      <a:ln w="9525" cap="flat" cmpd="sng" algn="ctr">
+        <a:solidFill>
+          <a:schemeClr val="tx1">
+            <a:lumMod val="25000"/>
+            <a:lumOff val="75000"/>
+          </a:schemeClr>
+        </a:solidFill>
+        <a:round/>
+      </a:ln>
+    </cs:spPr>
+    <cs:defRPr sz="1197" kern="1200"/>
+  </cs:categoryAxis>
+  <cs:chartArea mods="allowNoFillOverride allowNoLineOverride">
+    <cs:lnRef idx="0"/>
+    <cs:fillRef idx="0"/>
+    <cs:effectRef idx="0"/>
+    <cs:fontRef idx="minor">
+      <a:schemeClr val="tx1"/>
+    </cs:fontRef>
+    <cs:spPr>
+      <a:solidFill>
+        <a:schemeClr val="bg1"/>
+      </a:solidFill>
+      <a:ln w="9525" cap="flat" cmpd="sng" algn="ctr">
+        <a:solidFill>
+          <a:schemeClr val="tx1">
+            <a:lumMod val="15000"/>
+            <a:lumOff val="85000"/>
+          </a:schemeClr>
+        </a:solidFill>
+        <a:round/>
+      </a:ln>
+    </cs:spPr>
+    <cs:defRPr sz="1330" kern="1200"/>
+  </cs:chartArea>
+  <cs:dataLabel>
+    <cs:lnRef idx="0"/>
+    <cs:fillRef idx="0"/>
+    <cs:effectRef idx="0"/>
+    <cs:fontRef idx="minor">
+      <a:schemeClr val="tx1">
+        <a:lumMod val="75000"/>
+        <a:lumOff val="25000"/>
+      </a:schemeClr>
+    </cs:fontRef>
+    <cs:defRPr sz="1197" kern="1200"/>
+  </cs:dataLabel>
+  <cs:dataLabelCallout>
+    <cs:lnRef idx="0"/>
+    <cs:fillRef idx="0"/>
+    <cs:effectRef idx="0"/>
+    <cs:fontRef idx="minor">
+      <a:schemeClr val="dk1">
+        <a:lumMod val="65000"/>
+        <a:lumOff val="35000"/>
+      </a:schemeClr>
+    </cs:fontRef>
+    <cs:spPr>
+      <a:solidFill>
+        <a:schemeClr val="lt1"/>
+      </a:solidFill>
+      <a:ln>
+        <a:solidFill>
+          <a:schemeClr val="dk1">
+            <a:lumMod val="25000"/>
+            <a:lumOff val="75000"/>
+          </a:schemeClr>
+        </a:solidFill>
+      </a:ln>
+    </cs:spPr>
+    <cs:defRPr sz="1197" kern="1200"/>
+    <cs:bodyPr rot="0" spcFirstLastPara="1" vertOverflow="clip" horzOverflow="clip" vert="horz" wrap="square" lIns="36576" tIns="18288" rIns="36576" bIns="18288" anchor="ctr" anchorCtr="1">
+      <a:spAutoFit/>
+    </cs:bodyPr>
+  </cs:dataLabelCallout>
+  <cs:dataPoint>
+    <cs:lnRef idx="0"/>
+    <cs:fillRef idx="1">
+      <cs:styleClr val="auto"/>
+    </cs:fillRef>
+    <cs:effectRef idx="0"/>
+    <cs:fontRef idx="minor">
+      <a:schemeClr val="tx1"/>
+    </cs:fontRef>
+  </cs:dataPoint>
+  <cs:dataPoint3D>
+    <cs:lnRef idx="0"/>
+    <cs:fillRef idx="1">
+      <cs:styleClr val="auto"/>
+    </cs:fillRef>
+    <cs:effectRef idx="0"/>
+    <cs:fontRef idx="minor">
+      <a:schemeClr val="tx1"/>
+    </cs:fontRef>
+  </cs:dataPoint3D>
+  <cs:dataPointLine>
+    <cs:lnRef idx="0">
+      <cs:styleClr val="auto"/>
+    </cs:lnRef>
+    <cs:fillRef idx="1"/>
+    <cs:effectRef idx="0"/>
+    <cs:fontRef idx="minor">
+      <a:schemeClr val="tx1"/>
+    </cs:fontRef>
+    <cs:spPr>
+      <a:ln w="19050" cap="rnd">
+        <a:solidFill>
+          <a:schemeClr val="phClr"/>
+        </a:solidFill>
+        <a:round/>
+      </a:ln>
+    </cs:spPr>
+  </cs:dataPointLine>
+  <cs:dataPointMarker>
+    <cs:lnRef idx="0">
+      <cs:styleClr val="auto"/>
+    </cs:lnRef>
+    <cs:fillRef idx="1">
+      <cs:styleClr val="auto"/>
+    </cs:fillRef>
+    <cs:effectRef idx="0"/>
+    <cs:fontRef idx="minor">
+      <a:schemeClr val="tx1"/>
+    </cs:fontRef>
+    <cs:spPr>
+      <a:ln w="9525">
+        <a:solidFill>
+          <a:schemeClr val="phClr"/>
+        </a:solidFill>
+      </a:ln>
+    </cs:spPr>
+  </cs:dataPointMarker>
+  <cs:dataPointMarkerLayout symbol="circle" size="5"/>
+  <cs:dataPointWireframe>
+    <cs:lnRef idx="0">
+      <cs:styleClr val="auto"/>
+    </cs:lnRef>
+    <cs:fillRef idx="0"/>
+    <cs:effectRef idx="0"/>
+    <cs:fontRef idx="minor">
+      <a:schemeClr val="dk1"/>
+    </cs:fontRef>
+    <cs:spPr>
+      <a:ln w="9525" cap="rnd">
+        <a:solidFill>
+          <a:schemeClr val="phClr"/>
+        </a:solidFill>
+        <a:round/>
+      </a:ln>
+    </cs:spPr>
+  </cs:dataPointWireframe>
+  <cs:dataTable>
+    <cs:lnRef idx="0"/>
+    <cs:fillRef idx="0"/>
+    <cs:effectRef idx="0"/>
+    <cs:fontRef idx="minor">
+      <a:schemeClr val="tx1">
+        <a:lumMod val="65000"/>
+        <a:lumOff val="35000"/>
+      </a:schemeClr>
+    </cs:fontRef>
+    <cs:spPr>
+      <a:noFill/>
+      <a:ln w="9525" cap="flat" cmpd="sng" algn="ctr">
+        <a:solidFill>
+          <a:schemeClr val="tx1">
+            <a:lumMod val="15000"/>
+            <a:lumOff val="85000"/>
+          </a:schemeClr>
+        </a:solidFill>
+        <a:round/>
+      </a:ln>
+    </cs:spPr>
+    <cs:defRPr sz="1197" kern="1200"/>
+  </cs:dataTable>
+  <cs:downBar>
+    <cs:lnRef idx="0"/>
+    <cs:fillRef idx="0"/>
+    <cs:effectRef idx="0"/>
+    <cs:fontRef idx="minor">
+      <a:schemeClr val="tx1"/>
+    </cs:fontRef>
+    <cs:spPr>
+      <a:solidFill>
+        <a:schemeClr val="dk1">
+          <a:lumMod val="75000"/>
+          <a:lumOff val="25000"/>
+        </a:schemeClr>
+      </a:solidFill>
+      <a:ln w="9525" cap="flat" cmpd="sng" algn="ctr">
+        <a:solidFill>
+          <a:schemeClr val="tx1">
+            <a:lumMod val="65000"/>
+            <a:lumOff val="35000"/>
+          </a:schemeClr>
+        </a:solidFill>
+        <a:round/>
+      </a:ln>
+    </cs:spPr>
+  </cs:downBar>
+  <cs:dropLine>
+    <cs:lnRef idx="0"/>
+    <cs:fillRef idx="0"/>
+    <cs:effectRef idx="0"/>
+    <cs:fontRef idx="minor">
+      <a:schemeClr val="tx1"/>
+    </cs:fontRef>
+    <cs:spPr>
+      <a:ln w="9525" cap="flat" cmpd="sng" algn="ctr">
+        <a:solidFill>
+          <a:schemeClr val="tx1">
+            <a:lumMod val="35000"/>
+            <a:lumOff val="65000"/>
+          </a:schemeClr>
+        </a:solidFill>
+        <a:round/>
+      </a:ln>
+    </cs:spPr>
+  </cs:dropLine>
+  <cs:errorBar>
+    <cs:lnRef idx="0"/>
+    <cs:fillRef idx="0"/>
+    <cs:effectRef idx="0"/>
+    <cs:fontRef idx="minor">
+      <a:schemeClr val="tx1"/>
+    </cs:fontRef>
+    <cs:spPr>
+      <a:ln w="9525" cap="flat" cmpd="sng" algn="ctr">
+        <a:solidFill>
+          <a:schemeClr val="tx1">
+            <a:lumMod val="65000"/>
+            <a:lumOff val="35000"/>
+          </a:schemeClr>
+        </a:solidFill>
+        <a:round/>
+      </a:ln>
+    </cs:spPr>
+  </cs:errorBar>
+  <cs:floor>
+    <cs:lnRef idx="0"/>
+    <cs:fillRef idx="0"/>
+    <cs:effectRef idx="0"/>
+    <cs:fontRef idx="minor">
+      <a:schemeClr val="tx1"/>
+    </cs:fontRef>
+    <cs:spPr>
+      <a:noFill/>
+      <a:ln>
+        <a:noFill/>
+      </a:ln>
+    </cs:spPr>
+  </cs:floor>
+  <cs:gridlineMajor>
+    <cs:lnRef idx="0"/>
+    <cs:fillRef idx="0"/>
+    <cs:effectRef idx="0"/>
+    <cs:fontRef idx="minor">
+      <a:schemeClr val="tx1"/>
+    </cs:fontRef>
+    <cs:spPr>
+      <a:ln w="9525" cap="flat" cmpd="sng" algn="ctr">
+        <a:solidFill>
+          <a:schemeClr val="tx1">
+            <a:lumMod val="15000"/>
+            <a:lumOff val="85000"/>
+          </a:schemeClr>
+        </a:solidFill>
+        <a:round/>
+      </a:ln>
+    </cs:spPr>
+  </cs:gridlineMajor>
+  <cs:gridlineMinor>
+    <cs:lnRef idx="0"/>
+    <cs:fillRef idx="0"/>
+    <cs:effectRef idx="0"/>
+    <cs:fontRef idx="minor">
+      <a:schemeClr val="tx1"/>
+    </cs:fontRef>
+    <cs:spPr>
+      <a:ln w="9525" cap="flat" cmpd="sng" algn="ctr">
+        <a:solidFill>
+          <a:schemeClr val="tx1">
+            <a:lumMod val="5000"/>
+            <a:lumOff val="95000"/>
+          </a:schemeClr>
+        </a:solidFill>
+        <a:round/>
+      </a:ln>
+    </cs:spPr>
+  </cs:gridlineMinor>
+  <cs:hiLoLine>
+    <cs:lnRef idx="0"/>
+    <cs:fillRef idx="0"/>
+    <cs:effectRef idx="0"/>
+    <cs:fontRef idx="minor">
+      <a:schemeClr val="tx1"/>
+    </cs:fontRef>
+    <cs:spPr>
+      <a:ln w="9525" cap="flat" cmpd="sng" algn="ctr">
+        <a:solidFill>
+          <a:schemeClr val="tx1">
+            <a:lumMod val="50000"/>
+            <a:lumOff val="50000"/>
+          </a:schemeClr>
+        </a:solidFill>
+        <a:round/>
+      </a:ln>
+    </cs:spPr>
+  </cs:hiLoLine>
+  <cs:leaderLine>
+    <cs:lnRef idx="0"/>
+    <cs:fillRef idx="0"/>
+    <cs:effectRef idx="0"/>
+    <cs:fontRef idx="minor">
+      <a:schemeClr val="tx1"/>
+    </cs:fontRef>
+    <cs:spPr>
+      <a:ln w="9525" cap="flat" cmpd="sng" algn="ctr">
+        <a:solidFill>
+          <a:schemeClr val="tx1">
+            <a:lumMod val="35000"/>
+            <a:lumOff val="65000"/>
+          </a:schemeClr>
+        </a:solidFill>
+        <a:round/>
+      </a:ln>
+    </cs:spPr>
+  </cs:leaderLine>
+  <cs:legend>
+    <cs:lnRef idx="0"/>
+    <cs:fillRef idx="0"/>
+    <cs:effectRef idx="0"/>
+    <cs:fontRef idx="minor">
+      <a:schemeClr val="tx1">
+        <a:lumMod val="65000"/>
+        <a:lumOff val="35000"/>
+      </a:schemeClr>
+    </cs:fontRef>
+    <cs:defRPr sz="1197" kern="1200"/>
+  </cs:legend>
+  <cs:plotArea mods="allowNoFillOverride allowNoLineOverride">
+    <cs:lnRef idx="0"/>
+    <cs:fillRef idx="0"/>
+    <cs:effectRef idx="0"/>
+    <cs:fontRef idx="minor">
+      <a:schemeClr val="tx1"/>
+    </cs:fontRef>
+  </cs:plotArea>
+  <cs:plotArea3D mods="allowNoFillOverride allowNoLineOverride">
+    <cs:lnRef idx="0"/>
+    <cs:fillRef idx="0"/>
+    <cs:effectRef idx="0"/>
+    <cs:fontRef idx="minor">
+      <a:schemeClr val="tx1"/>
+    </cs:fontRef>
+  </cs:plotArea3D>
+  <cs:seriesAxis>
+    <cs:lnRef idx="0"/>
+    <cs:fillRef idx="0"/>
+    <cs:effectRef idx="0"/>
+    <cs:fontRef idx="minor">
+      <a:schemeClr val="tx1">
+        <a:lumMod val="65000"/>
+        <a:lumOff val="35000"/>
+      </a:schemeClr>
+    </cs:fontRef>
+    <cs:defRPr sz="1197" kern="1200"/>
+  </cs:seriesAxis>
+  <cs:seriesLine>
+    <cs:lnRef idx="0"/>
+    <cs:fillRef idx="0"/>
+    <cs:effectRef idx="0"/>
+    <cs:fontRef idx="minor">
+      <a:schemeClr val="tx1"/>
+    </cs:fontRef>
+    <cs:spPr>
+      <a:ln w="9525" cap="flat" cmpd="sng" algn="ctr">
+        <a:solidFill>
+          <a:schemeClr val="tx1">
+            <a:lumMod val="35000"/>
+            <a:lumOff val="65000"/>
+          </a:schemeClr>
+        </a:solidFill>
+        <a:round/>
+      </a:ln>
+    </cs:spPr>
+  </cs:seriesLine>
+  <cs:title>
+    <cs:lnRef idx="0"/>
+    <cs:fillRef idx="0"/>
+    <cs:effectRef idx="0"/>
+    <cs:fontRef idx="minor">
+      <a:schemeClr val="tx1">
+        <a:lumMod val="65000"/>
+        <a:lumOff val="35000"/>
+      </a:schemeClr>
+    </cs:fontRef>
+    <cs:defRPr sz="1862" b="0" kern="1200" spc="0" baseline="0"/>
+  </cs:title>
+  <cs:trendline>
+    <cs:lnRef idx="0">
+      <cs:styleClr val="auto"/>
+    </cs:lnRef>
+    <cs:fillRef idx="0"/>
+    <cs:effectRef idx="0"/>
+    <cs:fontRef idx="minor">
+      <a:schemeClr val="tx1"/>
+    </cs:fontRef>
+    <cs:spPr>
+      <a:ln w="19050" cap="rnd">
+        <a:solidFill>
+          <a:schemeClr val="phClr"/>
+        </a:solidFill>
+        <a:prstDash val="sysDot"/>
+      </a:ln>
+    </cs:spPr>
+  </cs:trendline>
+  <cs:trendlineLabel>
+    <cs:lnRef idx="0"/>
+    <cs:fillRef idx="0"/>
+    <cs:effectRef idx="0"/>
+    <cs:fontRef idx="minor">
+      <a:schemeClr val="tx1">
+        <a:lumMod val="65000"/>
+        <a:lumOff val="35000"/>
+      </a:schemeClr>
+    </cs:fontRef>
+    <cs:defRPr sz="1197" kern="1200"/>
+  </cs:trendlineLabel>
+  <cs:upBar>
+    <cs:lnRef idx="0"/>
+    <cs:fillRef idx="0"/>
+    <cs:effectRef idx="0"/>
+    <cs:fontRef idx="minor">
+      <a:schemeClr val="tx1"/>
+    </cs:fontRef>
+    <cs:spPr>
+      <a:solidFill>
+        <a:schemeClr val="lt1"/>
+      </a:solidFill>
+      <a:ln w="9525" cap="flat" cmpd="sng" algn="ctr">
+        <a:solidFill>
+          <a:schemeClr val="tx1">
+            <a:lumMod val="65000"/>
+            <a:lumOff val="35000"/>
+          </a:schemeClr>
+        </a:solidFill>
+        <a:round/>
+      </a:ln>
+    </cs:spPr>
+  </cs:upBar>
+  <cs:valueAxis>
+    <cs:lnRef idx="0"/>
+    <cs:fillRef idx="0"/>
+    <cs:effectRef idx="0"/>
+    <cs:fontRef idx="minor">
+      <a:schemeClr val="tx1">
+        <a:lumMod val="65000"/>
+        <a:lumOff val="35000"/>
+      </a:schemeClr>
+    </cs:fontRef>
+    <cs:spPr>
+      <a:ln w="9525" cap="flat" cmpd="sng" algn="ctr">
+        <a:solidFill>
+          <a:schemeClr val="tx1">
+            <a:lumMod val="25000"/>
+            <a:lumOff val="75000"/>
+          </a:schemeClr>
+        </a:solidFill>
+        <a:round/>
+      </a:ln>
+    </cs:spPr>
+    <cs:defRPr sz="1197" kern="1200"/>
+  </cs:valueAxis>
+  <cs:wall>
+    <cs:lnRef idx="0"/>
+    <cs:fillRef idx="0"/>
+    <cs:effectRef idx="0"/>
+    <cs:fontRef idx="minor">
+      <a:schemeClr val="tx1"/>
+    </cs:fontRef>
+    <cs:spPr>
+      <a:noFill/>
+      <a:ln>
+        <a:noFill/>
+      </a:ln>
+    </cs:spPr>
+  </cs:wall>
+</cs:chartStyle>
+</file>
+
 <file path=ppt/slideLayouts/slideLayout1.xml><?xml version="1.0" encoding="utf-8"?>
 <p:sldLayout xmlns:a="http://schemas.openxmlformats.org/drawingml/2006/main" xmlns:r="http://schemas.openxmlformats.org/officeDocument/2006/relationships" xmlns:p="http://schemas.openxmlformats.org/presentationml/2006/main" type="title" preserve="1">
   <p:cSld name="Title Slide">
@@ -263,7 +2232,7 @@
           <a:p>
             <a:fld id="{A242BE60-4EE4-4C6F-A8B2-CE58640AED56}" type="datetimeFigureOut">
               <a:rPr lang="en-SG" smtClean="0"/>
-              <a:t>12/1/2021</a:t>
+              <a:t>13/1/2021</a:t>
             </a:fld>
             <a:endParaRPr lang="en-SG"/>
           </a:p>
@@ -463,7 +2432,7 @@
           <a:p>
             <a:fld id="{A242BE60-4EE4-4C6F-A8B2-CE58640AED56}" type="datetimeFigureOut">
               <a:rPr lang="en-SG" smtClean="0"/>
-              <a:t>12/1/2021</a:t>
+              <a:t>13/1/2021</a:t>
             </a:fld>
             <a:endParaRPr lang="en-SG"/>
           </a:p>
@@ -673,7 +2642,7 @@
           <a:p>
             <a:fld id="{A242BE60-4EE4-4C6F-A8B2-CE58640AED56}" type="datetimeFigureOut">
               <a:rPr lang="en-SG" smtClean="0"/>
-              <a:t>12/1/2021</a:t>
+              <a:t>13/1/2021</a:t>
             </a:fld>
             <a:endParaRPr lang="en-SG"/>
           </a:p>
@@ -873,7 +2842,7 @@
           <a:p>
             <a:fld id="{A242BE60-4EE4-4C6F-A8B2-CE58640AED56}" type="datetimeFigureOut">
               <a:rPr lang="en-SG" smtClean="0"/>
-              <a:t>12/1/2021</a:t>
+              <a:t>13/1/2021</a:t>
             </a:fld>
             <a:endParaRPr lang="en-SG"/>
           </a:p>
@@ -1149,7 +3118,7 @@
           <a:p>
             <a:fld id="{A242BE60-4EE4-4C6F-A8B2-CE58640AED56}" type="datetimeFigureOut">
               <a:rPr lang="en-SG" smtClean="0"/>
-              <a:t>12/1/2021</a:t>
+              <a:t>13/1/2021</a:t>
             </a:fld>
             <a:endParaRPr lang="en-SG"/>
           </a:p>
@@ -1417,7 +3386,7 @@
           <a:p>
             <a:fld id="{A242BE60-4EE4-4C6F-A8B2-CE58640AED56}" type="datetimeFigureOut">
               <a:rPr lang="en-SG" smtClean="0"/>
-              <a:t>12/1/2021</a:t>
+              <a:t>13/1/2021</a:t>
             </a:fld>
             <a:endParaRPr lang="en-SG"/>
           </a:p>
@@ -1832,7 +3801,7 @@
           <a:p>
             <a:fld id="{A242BE60-4EE4-4C6F-A8B2-CE58640AED56}" type="datetimeFigureOut">
               <a:rPr lang="en-SG" smtClean="0"/>
-              <a:t>12/1/2021</a:t>
+              <a:t>13/1/2021</a:t>
             </a:fld>
             <a:endParaRPr lang="en-SG"/>
           </a:p>
@@ -1974,7 +3943,7 @@
           <a:p>
             <a:fld id="{A242BE60-4EE4-4C6F-A8B2-CE58640AED56}" type="datetimeFigureOut">
               <a:rPr lang="en-SG" smtClean="0"/>
-              <a:t>12/1/2021</a:t>
+              <a:t>13/1/2021</a:t>
             </a:fld>
             <a:endParaRPr lang="en-SG"/>
           </a:p>
@@ -2087,7 +4056,7 @@
           <a:p>
             <a:fld id="{A242BE60-4EE4-4C6F-A8B2-CE58640AED56}" type="datetimeFigureOut">
               <a:rPr lang="en-SG" smtClean="0"/>
-              <a:t>12/1/2021</a:t>
+              <a:t>13/1/2021</a:t>
             </a:fld>
             <a:endParaRPr lang="en-SG"/>
           </a:p>
@@ -2400,7 +4369,7 @@
           <a:p>
             <a:fld id="{A242BE60-4EE4-4C6F-A8B2-CE58640AED56}" type="datetimeFigureOut">
               <a:rPr lang="en-SG" smtClean="0"/>
-              <a:t>12/1/2021</a:t>
+              <a:t>13/1/2021</a:t>
             </a:fld>
             <a:endParaRPr lang="en-SG"/>
           </a:p>
@@ -2689,7 +4658,7 @@
           <a:p>
             <a:fld id="{A242BE60-4EE4-4C6F-A8B2-CE58640AED56}" type="datetimeFigureOut">
               <a:rPr lang="en-SG" smtClean="0"/>
-              <a:t>12/1/2021</a:t>
+              <a:t>13/1/2021</a:t>
             </a:fld>
             <a:endParaRPr lang="en-SG"/>
           </a:p>
@@ -2932,7 +4901,7 @@
           <a:p>
             <a:fld id="{A242BE60-4EE4-4C6F-A8B2-CE58640AED56}" type="datetimeFigureOut">
               <a:rPr lang="en-SG" smtClean="0"/>
-              <a:t>12/1/2021</a:t>
+              <a:t>13/1/2021</a:t>
             </a:fld>
             <a:endParaRPr lang="en-SG"/>
           </a:p>
@@ -3351,10 +5320,10 @@
       </p:grpSpPr>
       <p:sp>
         <p:nvSpPr>
-          <p:cNvPr id="6" name="Rectangle 5">
-            <a:extLst>
-              <a:ext uri="{FF2B5EF4-FFF2-40B4-BE49-F238E27FC236}">
-                <a16:creationId xmlns:a16="http://schemas.microsoft.com/office/drawing/2014/main" id="{E25D5BAF-29AC-437C-A525-8CB7CE243F57}"/>
+          <p:cNvPr id="61" name="Rectangle 60">
+            <a:extLst>
+              <a:ext uri="{FF2B5EF4-FFF2-40B4-BE49-F238E27FC236}">
+                <a16:creationId xmlns:a16="http://schemas.microsoft.com/office/drawing/2014/main" id="{FE0EBB2A-AA2E-4D26-9F7A-B70E208ADC34}"/>
               </a:ext>
             </a:extLst>
           </p:cNvPr>
@@ -3363,8 +5332,8 @@
         </p:nvSpPr>
         <p:spPr>
           <a:xfrm>
-            <a:off x="1446415" y="677487"/>
-            <a:ext cx="2360814" cy="5503026"/>
+            <a:off x="3904631" y="440347"/>
+            <a:ext cx="4037733" cy="5986691"/>
           </a:xfrm>
           <a:prstGeom prst="rect">
             <a:avLst/>
@@ -3393,6 +5362,58 @@
           </a:fontRef>
         </p:style>
         <p:txBody>
+          <a:bodyPr rtlCol="0" anchor="ctr"/>
+          <a:lstStyle/>
+          <a:p>
+            <a:pPr algn="ctr"/>
+            <a:endParaRPr lang="en-SG"/>
+          </a:p>
+        </p:txBody>
+      </p:sp>
+      <p:sp>
+        <p:nvSpPr>
+          <p:cNvPr id="6" name="Rectangle 5">
+            <a:extLst>
+              <a:ext uri="{FF2B5EF4-FFF2-40B4-BE49-F238E27FC236}">
+                <a16:creationId xmlns:a16="http://schemas.microsoft.com/office/drawing/2014/main" id="{E25D5BAF-29AC-437C-A525-8CB7CE243F57}"/>
+              </a:ext>
+            </a:extLst>
+          </p:cNvPr>
+          <p:cNvSpPr/>
+          <p:nvPr/>
+        </p:nvSpPr>
+        <p:spPr>
+          <a:xfrm>
+            <a:off x="1404303" y="430961"/>
+            <a:ext cx="2480651" cy="5977304"/>
+          </a:xfrm>
+          <a:prstGeom prst="rect">
+            <a:avLst/>
+          </a:prstGeom>
+          <a:solidFill>
+            <a:schemeClr val="accent1">
+              <a:lumMod val="60000"/>
+              <a:lumOff val="40000"/>
+            </a:schemeClr>
+          </a:solidFill>
+        </p:spPr>
+        <p:style>
+          <a:lnRef idx="2">
+            <a:schemeClr val="accent1">
+              <a:shade val="50000"/>
+            </a:schemeClr>
+          </a:lnRef>
+          <a:fillRef idx="1">
+            <a:schemeClr val="accent1"/>
+          </a:fillRef>
+          <a:effectRef idx="0">
+            <a:schemeClr val="accent1"/>
+          </a:effectRef>
+          <a:fontRef idx="minor">
+            <a:schemeClr val="lt1"/>
+          </a:fontRef>
+        </p:style>
+        <p:txBody>
           <a:bodyPr rtlCol="0" anchor="t"/>
           <a:lstStyle/>
           <a:p>
@@ -3446,8 +5467,8 @@
         </p:nvSpPr>
         <p:spPr>
           <a:xfrm>
-            <a:off x="1446415" y="677487"/>
-            <a:ext cx="9576262" cy="5503026"/>
+            <a:off x="1401351" y="440347"/>
+            <a:ext cx="9856585" cy="5977305"/>
           </a:xfrm>
           <a:prstGeom prst="rect">
             <a:avLst/>
@@ -3493,7 +5514,7 @@
         </p:nvCxnSpPr>
         <p:spPr>
           <a:xfrm>
-            <a:off x="1446415" y="1828800"/>
+            <a:off x="1401352" y="1591661"/>
             <a:ext cx="2360814" cy="0"/>
           </a:xfrm>
           <a:prstGeom prst="line">
@@ -3517,66 +5538,19 @@
       </p:cxnSp>
       <p:sp>
         <p:nvSpPr>
-          <p:cNvPr id="10" name="Rectangle 9">
-            <a:extLst>
-              <a:ext uri="{FF2B5EF4-FFF2-40B4-BE49-F238E27FC236}">
-                <a16:creationId xmlns:a16="http://schemas.microsoft.com/office/drawing/2014/main" id="{99A3BA99-65AE-400E-926B-E26B5A294E52}"/>
-              </a:ext>
-            </a:extLst>
-          </p:cNvPr>
-          <p:cNvSpPr/>
+          <p:cNvPr id="11" name="TextBox 10">
+            <a:extLst>
+              <a:ext uri="{FF2B5EF4-FFF2-40B4-BE49-F238E27FC236}">
+                <a16:creationId xmlns:a16="http://schemas.microsoft.com/office/drawing/2014/main" id="{35D3AC2A-CF85-4551-8366-8575D971512C}"/>
+              </a:ext>
+            </a:extLst>
+          </p:cNvPr>
+          <p:cNvSpPr txBox="1"/>
           <p:nvPr/>
         </p:nvSpPr>
         <p:spPr>
           <a:xfrm>
-            <a:off x="4522124" y="897775"/>
-            <a:ext cx="5802283" cy="2693323"/>
-          </a:xfrm>
-          <a:prstGeom prst="rect">
-            <a:avLst/>
-          </a:prstGeom>
-          <a:noFill/>
-        </p:spPr>
-        <p:style>
-          <a:lnRef idx="2">
-            <a:schemeClr val="accent1">
-              <a:shade val="50000"/>
-            </a:schemeClr>
-          </a:lnRef>
-          <a:fillRef idx="1">
-            <a:schemeClr val="accent1"/>
-          </a:fillRef>
-          <a:effectRef idx="0">
-            <a:schemeClr val="accent1"/>
-          </a:effectRef>
-          <a:fontRef idx="minor">
-            <a:schemeClr val="lt1"/>
-          </a:fontRef>
-        </p:style>
-        <p:txBody>
-          <a:bodyPr rtlCol="0" anchor="ctr"/>
-          <a:lstStyle/>
-          <a:p>
-            <a:pPr algn="ctr"/>
-            <a:endParaRPr lang="en-SG"/>
-          </a:p>
-        </p:txBody>
-      </p:sp>
-      <p:sp>
-        <p:nvSpPr>
-          <p:cNvPr id="11" name="TextBox 10">
-            <a:extLst>
-              <a:ext uri="{FF2B5EF4-FFF2-40B4-BE49-F238E27FC236}">
-                <a16:creationId xmlns:a16="http://schemas.microsoft.com/office/drawing/2014/main" id="{35D3AC2A-CF85-4551-8366-8575D971512C}"/>
-              </a:ext>
-            </a:extLst>
-          </p:cNvPr>
-          <p:cNvSpPr txBox="1"/>
-          <p:nvPr/>
-        </p:nvSpPr>
-        <p:spPr>
-          <a:xfrm>
-            <a:off x="1465081" y="735928"/>
+            <a:off x="1420018" y="498789"/>
             <a:ext cx="2211185" cy="830997"/>
           </a:xfrm>
           <a:prstGeom prst="rect">
@@ -3595,60 +5569,8 @@
                 <a:latin typeface="Arial Nova Light" panose="020B0304020202020204" pitchFamily="34" charset="0"/>
                 <a:cs typeface="Angsana New" panose="02020603050405020304" pitchFamily="18" charset="-34"/>
               </a:rPr>
-              <a:t>CALIFORNIA HOUSING</a:t>
-            </a:r>
-          </a:p>
-        </p:txBody>
-      </p:sp>
-      <p:sp>
-        <p:nvSpPr>
-          <p:cNvPr id="13" name="TextBox 12">
-            <a:extLst>
-              <a:ext uri="{FF2B5EF4-FFF2-40B4-BE49-F238E27FC236}">
-                <a16:creationId xmlns:a16="http://schemas.microsoft.com/office/drawing/2014/main" id="{2B81195F-6FCD-4DAE-9227-8C9BE8004B7B}"/>
-              </a:ext>
-            </a:extLst>
-          </p:cNvPr>
-          <p:cNvSpPr txBox="1"/>
-          <p:nvPr/>
-        </p:nvSpPr>
-        <p:spPr>
-          <a:xfrm>
-            <a:off x="4522124" y="3314099"/>
-            <a:ext cx="6093228" cy="261610"/>
-          </a:xfrm>
-          <a:prstGeom prst="rect">
-            <a:avLst/>
-          </a:prstGeom>
-          <a:noFill/>
-        </p:spPr>
-        <p:txBody>
-          <a:bodyPr wrap="square">
-            <a:spAutoFit/>
-          </a:bodyPr>
-          <a:lstStyle/>
-          <a:p>
-            <a:r>
-              <a:rPr lang="en-US" sz="1100" i="1" dirty="0">
-                <a:latin typeface="Arial Nova Light" panose="020B0304020202020204" pitchFamily="34" charset="0"/>
-              </a:rPr>
-              <a:t>California map by Bence </a:t>
-            </a:r>
-            <a:r>
-              <a:rPr lang="en-US" sz="1100" i="1" dirty="0" err="1">
-                <a:latin typeface="Arial Nova Light" panose="020B0304020202020204" pitchFamily="34" charset="0"/>
-              </a:rPr>
-              <a:t>Bezeredy</a:t>
-            </a:r>
-            <a:r>
-              <a:rPr lang="en-US" sz="1100" i="1" dirty="0">
-                <a:latin typeface="Arial Nova Light" panose="020B0304020202020204" pitchFamily="34" charset="0"/>
-              </a:rPr>
-              <a:t> from the Noun Project</a:t>
-            </a:r>
-            <a:endParaRPr lang="en-SG" sz="1100" i="1" dirty="0">
-              <a:latin typeface="Arial Nova Light" panose="020B0304020202020204" pitchFamily="34" charset="0"/>
-            </a:endParaRPr>
+              <a:t>MOVIE SELECTION</a:t>
+            </a:r>
           </a:p>
         </p:txBody>
       </p:sp>
@@ -3668,7 +5590,7 @@
         </p:nvCxnSpPr>
         <p:spPr>
           <a:xfrm flipH="1">
-            <a:off x="9493573" y="1626247"/>
+            <a:off x="9804505" y="1192574"/>
             <a:ext cx="965153" cy="399087"/>
           </a:xfrm>
           <a:prstGeom prst="straightConnector1">
@@ -3696,104 +5618,19 @@
       </p:cxnSp>
       <p:sp>
         <p:nvSpPr>
-          <p:cNvPr id="23" name="Rectangle 22">
-            <a:extLst>
-              <a:ext uri="{FF2B5EF4-FFF2-40B4-BE49-F238E27FC236}">
-                <a16:creationId xmlns:a16="http://schemas.microsoft.com/office/drawing/2014/main" id="{DF99A5C9-1C6F-4173-9DAA-A0175AEF4677}"/>
-              </a:ext>
-            </a:extLst>
-          </p:cNvPr>
-          <p:cNvSpPr/>
+          <p:cNvPr id="2" name="TextBox 1">
+            <a:extLst>
+              <a:ext uri="{FF2B5EF4-FFF2-40B4-BE49-F238E27FC236}">
+                <a16:creationId xmlns:a16="http://schemas.microsoft.com/office/drawing/2014/main" id="{9296E6AC-20E6-436A-B424-0C9ED3E561F1}"/>
+              </a:ext>
+            </a:extLst>
+          </p:cNvPr>
+          <p:cNvSpPr txBox="1"/>
           <p:nvPr/>
         </p:nvSpPr>
         <p:spPr>
           <a:xfrm>
-            <a:off x="4522124" y="4099243"/>
-            <a:ext cx="2759825" cy="1908179"/>
-          </a:xfrm>
-          <a:prstGeom prst="rect">
-            <a:avLst/>
-          </a:prstGeom>
-          <a:noFill/>
-        </p:spPr>
-        <p:style>
-          <a:lnRef idx="2">
-            <a:schemeClr val="accent1">
-              <a:shade val="50000"/>
-            </a:schemeClr>
-          </a:lnRef>
-          <a:fillRef idx="1">
-            <a:schemeClr val="accent1"/>
-          </a:fillRef>
-          <a:effectRef idx="0">
-            <a:schemeClr val="accent1"/>
-          </a:effectRef>
-          <a:fontRef idx="minor">
-            <a:schemeClr val="lt1"/>
-          </a:fontRef>
-        </p:style>
-        <p:txBody>
-          <a:bodyPr rtlCol="0" anchor="ctr"/>
-          <a:lstStyle/>
-          <a:p>
-            <a:pPr algn="ctr"/>
-            <a:endParaRPr lang="en-SG"/>
-          </a:p>
-        </p:txBody>
-      </p:sp>
-      <p:sp>
-        <p:nvSpPr>
-          <p:cNvPr id="24" name="TextBox 23">
-            <a:extLst>
-              <a:ext uri="{FF2B5EF4-FFF2-40B4-BE49-F238E27FC236}">
-                <a16:creationId xmlns:a16="http://schemas.microsoft.com/office/drawing/2014/main" id="{9A18F50D-8BD6-4E9A-868E-95E9A75B71E9}"/>
-              </a:ext>
-            </a:extLst>
-          </p:cNvPr>
-          <p:cNvSpPr txBox="1"/>
-          <p:nvPr/>
-        </p:nvSpPr>
-        <p:spPr>
-          <a:xfrm>
-            <a:off x="5751240" y="5036895"/>
-            <a:ext cx="1812175" cy="923330"/>
-          </a:xfrm>
-          <a:prstGeom prst="rect">
-            <a:avLst/>
-          </a:prstGeom>
-          <a:noFill/>
-        </p:spPr>
-        <p:txBody>
-          <a:bodyPr wrap="square" rtlCol="0">
-            <a:spAutoFit/>
-          </a:bodyPr>
-          <a:lstStyle/>
-          <a:p>
-            <a:r>
-              <a:rPr lang="en-SG" b="1" dirty="0">
-                <a:latin typeface="MV Boli" panose="02000500030200090000" pitchFamily="2" charset="0"/>
-                <a:cs typeface="MV Boli" panose="02000500030200090000" pitchFamily="2" charset="0"/>
-              </a:rPr>
-              <a:t>HOUSE AGE &amp; HOUSE VALUE DIST</a:t>
-            </a:r>
-          </a:p>
-        </p:txBody>
-      </p:sp>
-      <p:sp>
-        <p:nvSpPr>
-          <p:cNvPr id="2" name="TextBox 1">
-            <a:extLst>
-              <a:ext uri="{FF2B5EF4-FFF2-40B4-BE49-F238E27FC236}">
-                <a16:creationId xmlns:a16="http://schemas.microsoft.com/office/drawing/2014/main" id="{9296E6AC-20E6-436A-B424-0C9ED3E561F1}"/>
-              </a:ext>
-            </a:extLst>
-          </p:cNvPr>
-          <p:cNvSpPr txBox="1"/>
-          <p:nvPr/>
-        </p:nvSpPr>
-        <p:spPr>
-          <a:xfrm>
-            <a:off x="1529542" y="2012856"/>
+            <a:off x="1484479" y="1775717"/>
             <a:ext cx="2211185" cy="400110"/>
           </a:xfrm>
           <a:prstGeom prst="rect">
@@ -3830,7 +5667,7 @@
         </p:nvSpPr>
         <p:spPr>
           <a:xfrm>
-            <a:off x="1596044" y="2936186"/>
+            <a:off x="1550981" y="2699047"/>
             <a:ext cx="1949261" cy="338554"/>
           </a:xfrm>
           <a:prstGeom prst="flowChartProcess">
@@ -3884,7 +5721,7 @@
         </p:nvSpPr>
         <p:spPr>
           <a:xfrm>
-            <a:off x="45063" y="2435327"/>
+            <a:off x="0" y="2198188"/>
             <a:ext cx="1812175" cy="646331"/>
           </a:xfrm>
           <a:prstGeom prst="rect">
@@ -3925,7 +5762,7 @@
         </p:nvCxnSpPr>
         <p:spPr>
           <a:xfrm>
-            <a:off x="1155470" y="2847339"/>
+            <a:off x="1110407" y="2610200"/>
             <a:ext cx="440574" cy="258124"/>
           </a:xfrm>
           <a:prstGeom prst="straightConnector1">
@@ -3965,7 +5802,7 @@
         </p:nvSpPr>
         <p:spPr>
           <a:xfrm>
-            <a:off x="1533919" y="2637511"/>
+            <a:off x="1488856" y="2400372"/>
             <a:ext cx="1949261" cy="338554"/>
           </a:xfrm>
           <a:prstGeom prst="rect">
@@ -3983,7 +5820,7 @@
               <a:rPr lang="en-US" sz="1600" dirty="0">
                 <a:latin typeface="Arial Nova Light" panose="020B0304020202020204" pitchFamily="34" charset="0"/>
               </a:rPr>
-              <a:t>Ocean proximity</a:t>
+              <a:t>Genre</a:t>
             </a:r>
             <a:endParaRPr lang="en-SG" sz="1600" dirty="0">
               <a:latin typeface="Arial Nova Light" panose="020B0304020202020204" pitchFamily="34" charset="0"/>
@@ -3993,360 +5830,26 @@
       </p:sp>
       <p:sp>
         <p:nvSpPr>
-          <p:cNvPr id="26" name="Rectangle 25">
-            <a:extLst>
-              <a:ext uri="{FF2B5EF4-FFF2-40B4-BE49-F238E27FC236}">
-                <a16:creationId xmlns:a16="http://schemas.microsoft.com/office/drawing/2014/main" id="{8EEB5D24-8E55-4136-8A79-585605600730}"/>
-              </a:ext>
-            </a:extLst>
-          </p:cNvPr>
-          <p:cNvSpPr/>
+          <p:cNvPr id="20" name="TextBox 19">
+            <a:extLst>
+              <a:ext uri="{FF2B5EF4-FFF2-40B4-BE49-F238E27FC236}">
+                <a16:creationId xmlns:a16="http://schemas.microsoft.com/office/drawing/2014/main" id="{60F6DE95-F621-412C-8966-78DC7C024DB5}"/>
+              </a:ext>
+            </a:extLst>
+          </p:cNvPr>
+          <p:cNvSpPr txBox="1"/>
           <p:nvPr/>
         </p:nvSpPr>
         <p:spPr>
           <a:xfrm>
-            <a:off x="7539059" y="4083017"/>
-            <a:ext cx="2759825" cy="1908179"/>
+            <a:off x="10982660" y="900207"/>
+            <a:ext cx="1421545" cy="1754326"/>
           </a:xfrm>
           <a:prstGeom prst="rect">
             <a:avLst/>
           </a:prstGeom>
           <a:noFill/>
         </p:spPr>
-        <p:style>
-          <a:lnRef idx="2">
-            <a:schemeClr val="accent1">
-              <a:shade val="50000"/>
-            </a:schemeClr>
-          </a:lnRef>
-          <a:fillRef idx="1">
-            <a:schemeClr val="accent1"/>
-          </a:fillRef>
-          <a:effectRef idx="0">
-            <a:schemeClr val="accent1"/>
-          </a:effectRef>
-          <a:fontRef idx="minor">
-            <a:schemeClr val="lt1"/>
-          </a:fontRef>
-        </p:style>
-        <p:txBody>
-          <a:bodyPr rtlCol="0" anchor="ctr"/>
-          <a:lstStyle/>
-          <a:p>
-            <a:pPr marL="342900" indent="-342900">
-              <a:buFont typeface="+mj-lt"/>
-              <a:buAutoNum type="arabicPeriod"/>
-            </a:pPr>
-            <a:endParaRPr lang="en-SG" dirty="0">
-              <a:solidFill>
-                <a:schemeClr val="tx1"/>
-              </a:solidFill>
-            </a:endParaRPr>
-          </a:p>
-        </p:txBody>
-      </p:sp>
-      <p:pic>
-        <p:nvPicPr>
-          <p:cNvPr id="29" name="Picture 28">
-            <a:extLst>
-              <a:ext uri="{FF2B5EF4-FFF2-40B4-BE49-F238E27FC236}">
-                <a16:creationId xmlns:a16="http://schemas.microsoft.com/office/drawing/2014/main" id="{F3A1B525-3BF9-4CBF-8C45-4759A0C29DEC}"/>
-              </a:ext>
-            </a:extLst>
-          </p:cNvPr>
-          <p:cNvPicPr>
-            <a:picLocks noChangeAspect="1"/>
-          </p:cNvPicPr>
-          <p:nvPr/>
-        </p:nvPicPr>
-        <p:blipFill>
-          <a:blip r:embed="rId2">
-            <a:extLst>
-              <a:ext uri="{28A0092B-C50C-407E-A947-70E740481C1C}">
-                <a14:useLocalDpi xmlns:a14="http://schemas.microsoft.com/office/drawing/2010/main" val="0"/>
-              </a:ext>
-            </a:extLst>
-          </a:blip>
-          <a:stretch>
-            <a:fillRect/>
-          </a:stretch>
-        </p:blipFill>
-        <p:spPr>
-          <a:xfrm>
-            <a:off x="4779234" y="4384943"/>
-            <a:ext cx="1812176" cy="968114"/>
-          </a:xfrm>
-          <a:prstGeom prst="rect">
-            <a:avLst/>
-          </a:prstGeom>
-        </p:spPr>
-      </p:pic>
-      <p:pic>
-        <p:nvPicPr>
-          <p:cNvPr id="30" name="Picture 29">
-            <a:extLst>
-              <a:ext uri="{FF2B5EF4-FFF2-40B4-BE49-F238E27FC236}">
-                <a16:creationId xmlns:a16="http://schemas.microsoft.com/office/drawing/2014/main" id="{EB43CA68-739F-4552-83C9-64F7845D8BF5}"/>
-              </a:ext>
-            </a:extLst>
-          </p:cNvPr>
-          <p:cNvPicPr>
-            <a:picLocks noChangeAspect="1"/>
-          </p:cNvPicPr>
-          <p:nvPr/>
-        </p:nvPicPr>
-        <p:blipFill>
-          <a:blip r:embed="rId2">
-            <a:duotone>
-              <a:schemeClr val="accent1">
-                <a:shade val="45000"/>
-                <a:satMod val="135000"/>
-              </a:schemeClr>
-              <a:prstClr val="white"/>
-            </a:duotone>
-            <a:extLst>
-              <a:ext uri="{28A0092B-C50C-407E-A947-70E740481C1C}">
-                <a14:useLocalDpi xmlns:a14="http://schemas.microsoft.com/office/drawing/2010/main" val="0"/>
-              </a:ext>
-            </a:extLst>
-          </a:blip>
-          <a:stretch>
-            <a:fillRect/>
-          </a:stretch>
-        </p:blipFill>
-        <p:spPr>
-          <a:xfrm>
-            <a:off x="5208581" y="4384943"/>
-            <a:ext cx="1812176" cy="968114"/>
-          </a:xfrm>
-          <a:prstGeom prst="rect">
-            <a:avLst/>
-          </a:prstGeom>
-        </p:spPr>
-      </p:pic>
-      <p:sp>
-        <p:nvSpPr>
-          <p:cNvPr id="31" name="TextBox 30">
-            <a:extLst>
-              <a:ext uri="{FF2B5EF4-FFF2-40B4-BE49-F238E27FC236}">
-                <a16:creationId xmlns:a16="http://schemas.microsoft.com/office/drawing/2014/main" id="{B43F8589-556B-48C7-BF5B-567D5E88454F}"/>
-              </a:ext>
-            </a:extLst>
-          </p:cNvPr>
-          <p:cNvSpPr txBox="1"/>
-          <p:nvPr/>
-        </p:nvSpPr>
-        <p:spPr>
-          <a:xfrm>
-            <a:off x="4516801" y="5822039"/>
-            <a:ext cx="6093228" cy="261610"/>
-          </a:xfrm>
-          <a:prstGeom prst="rect">
-            <a:avLst/>
-          </a:prstGeom>
-          <a:noFill/>
-        </p:spPr>
-        <p:txBody>
-          <a:bodyPr wrap="square">
-            <a:spAutoFit/>
-          </a:bodyPr>
-          <a:lstStyle/>
-          <a:p>
-            <a:r>
-              <a:rPr lang="en-SG" sz="1100" i="1" dirty="0">
-                <a:latin typeface="Arial Nova Light" panose="020B0304020202020204" pitchFamily="34" charset="0"/>
-              </a:rPr>
-              <a:t>https://www.clipartmax.co</a:t>
-            </a:r>
-          </a:p>
-        </p:txBody>
-      </p:sp>
-      <p:sp>
-        <p:nvSpPr>
-          <p:cNvPr id="32" name="Flowchart: Process 31">
-            <a:extLst>
-              <a:ext uri="{FF2B5EF4-FFF2-40B4-BE49-F238E27FC236}">
-                <a16:creationId xmlns:a16="http://schemas.microsoft.com/office/drawing/2014/main" id="{65B768BE-0E93-4F83-B6C7-42854FA8F2C8}"/>
-              </a:ext>
-            </a:extLst>
-          </p:cNvPr>
-          <p:cNvSpPr/>
-          <p:nvPr/>
-        </p:nvSpPr>
-        <p:spPr>
-          <a:xfrm>
-            <a:off x="4516801" y="3649890"/>
-            <a:ext cx="2770471" cy="449353"/>
-          </a:xfrm>
-          <a:prstGeom prst="flowChartProcess">
-            <a:avLst/>
-          </a:prstGeom>
-          <a:solidFill>
-            <a:schemeClr val="accent1">
-              <a:lumMod val="50000"/>
-            </a:schemeClr>
-          </a:solidFill>
-        </p:spPr>
-        <p:style>
-          <a:lnRef idx="2">
-            <a:schemeClr val="accent1">
-              <a:shade val="50000"/>
-            </a:schemeClr>
-          </a:lnRef>
-          <a:fillRef idx="1">
-            <a:schemeClr val="accent1"/>
-          </a:fillRef>
-          <a:effectRef idx="0">
-            <a:schemeClr val="accent1"/>
-          </a:effectRef>
-          <a:fontRef idx="minor">
-            <a:schemeClr val="lt1"/>
-          </a:fontRef>
-        </p:style>
-        <p:txBody>
-          <a:bodyPr rtlCol="0" anchor="ctr"/>
-          <a:lstStyle/>
-          <a:p>
-            <a:pPr algn="ctr"/>
-            <a:r>
-              <a:rPr lang="en-US" sz="1500" dirty="0">
-                <a:solidFill>
-                  <a:schemeClr val="bg1"/>
-                </a:solidFill>
-                <a:latin typeface="Arial Nova Light" panose="020B0304020202020204" pitchFamily="34" charset="0"/>
-              </a:rPr>
-              <a:t>Relationship between house age and value</a:t>
-            </a:r>
-            <a:endParaRPr lang="en-SG" sz="1500" dirty="0">
-              <a:solidFill>
-                <a:schemeClr val="bg1"/>
-              </a:solidFill>
-              <a:latin typeface="Arial Nova Light" panose="020B0304020202020204" pitchFamily="34" charset="0"/>
-            </a:endParaRPr>
-          </a:p>
-        </p:txBody>
-      </p:sp>
-      <p:pic>
-        <p:nvPicPr>
-          <p:cNvPr id="34" name="Picture 33">
-            <a:extLst>
-              <a:ext uri="{FF2B5EF4-FFF2-40B4-BE49-F238E27FC236}">
-                <a16:creationId xmlns:a16="http://schemas.microsoft.com/office/drawing/2014/main" id="{17564431-9AD3-4D46-BE1F-1535B969C77B}"/>
-              </a:ext>
-            </a:extLst>
-          </p:cNvPr>
-          <p:cNvPicPr>
-            <a:picLocks noChangeAspect="1"/>
-          </p:cNvPicPr>
-          <p:nvPr/>
-        </p:nvPicPr>
-        <p:blipFill rotWithShape="1">
-          <a:blip r:embed="rId3">
-            <a:extLst>
-              <a:ext uri="{28A0092B-C50C-407E-A947-70E740481C1C}">
-                <a14:useLocalDpi xmlns:a14="http://schemas.microsoft.com/office/drawing/2010/main" val="0"/>
-              </a:ext>
-            </a:extLst>
-          </a:blip>
-          <a:srcRect b="16644"/>
-          <a:stretch/>
-        </p:blipFill>
-        <p:spPr>
-          <a:xfrm>
-            <a:off x="6467632" y="1136109"/>
-            <a:ext cx="2959111" cy="2466584"/>
-          </a:xfrm>
-          <a:prstGeom prst="rect">
-            <a:avLst/>
-          </a:prstGeom>
-        </p:spPr>
-      </p:pic>
-      <p:sp>
-        <p:nvSpPr>
-          <p:cNvPr id="35" name="Flowchart: Process 34">
-            <a:extLst>
-              <a:ext uri="{FF2B5EF4-FFF2-40B4-BE49-F238E27FC236}">
-                <a16:creationId xmlns:a16="http://schemas.microsoft.com/office/drawing/2014/main" id="{50FED331-0408-4AC7-ABE3-0BC384A90EA4}"/>
-              </a:ext>
-            </a:extLst>
-          </p:cNvPr>
-          <p:cNvSpPr/>
-          <p:nvPr/>
-        </p:nvSpPr>
-        <p:spPr>
-          <a:xfrm>
-            <a:off x="4522125" y="875398"/>
-            <a:ext cx="5801116" cy="305010"/>
-          </a:xfrm>
-          <a:prstGeom prst="flowChartProcess">
-            <a:avLst/>
-          </a:prstGeom>
-          <a:solidFill>
-            <a:schemeClr val="accent1">
-              <a:lumMod val="50000"/>
-            </a:schemeClr>
-          </a:solidFill>
-        </p:spPr>
-        <p:style>
-          <a:lnRef idx="2">
-            <a:schemeClr val="accent1">
-              <a:shade val="50000"/>
-            </a:schemeClr>
-          </a:lnRef>
-          <a:fillRef idx="1">
-            <a:schemeClr val="accent1"/>
-          </a:fillRef>
-          <a:effectRef idx="0">
-            <a:schemeClr val="accent1"/>
-          </a:effectRef>
-          <a:fontRef idx="minor">
-            <a:schemeClr val="lt1"/>
-          </a:fontRef>
-        </p:style>
-        <p:txBody>
-          <a:bodyPr rtlCol="0" anchor="ctr"/>
-          <a:lstStyle/>
-          <a:p>
-            <a:r>
-              <a:rPr lang="en-US" sz="1500" dirty="0">
-                <a:solidFill>
-                  <a:schemeClr val="bg1"/>
-                </a:solidFill>
-                <a:latin typeface="Arial Nova Light" panose="020B0304020202020204" pitchFamily="34" charset="0"/>
-              </a:rPr>
-              <a:t>Map of median house value and owner’s median income</a:t>
-            </a:r>
-            <a:endParaRPr lang="en-SG" sz="1500" dirty="0">
-              <a:solidFill>
-                <a:schemeClr val="bg1"/>
-              </a:solidFill>
-              <a:latin typeface="Arial Nova Light" panose="020B0304020202020204" pitchFamily="34" charset="0"/>
-            </a:endParaRPr>
-          </a:p>
-        </p:txBody>
-      </p:sp>
-      <p:sp>
-        <p:nvSpPr>
-          <p:cNvPr id="20" name="TextBox 19">
-            <a:extLst>
-              <a:ext uri="{FF2B5EF4-FFF2-40B4-BE49-F238E27FC236}">
-                <a16:creationId xmlns:a16="http://schemas.microsoft.com/office/drawing/2014/main" id="{60F6DE95-F621-412C-8966-78DC7C024DB5}"/>
-              </a:ext>
-            </a:extLst>
-          </p:cNvPr>
-          <p:cNvSpPr txBox="1"/>
-          <p:nvPr/>
-        </p:nvSpPr>
-        <p:spPr>
-          <a:xfrm>
-            <a:off x="10274971" y="1102912"/>
-            <a:ext cx="1812175" cy="2862322"/>
-          </a:xfrm>
-          <a:prstGeom prst="rect">
-            <a:avLst/>
-          </a:prstGeom>
-          <a:noFill/>
-        </p:spPr>
         <p:txBody>
           <a:bodyPr wrap="square" rtlCol="0">
             <a:spAutoFit/>
@@ -4358,7 +5861,7 @@
                 <a:latin typeface="MV Boli" panose="02000500030200090000" pitchFamily="2" charset="0"/>
                 <a:cs typeface="MV Boli" panose="02000500030200090000" pitchFamily="2" charset="0"/>
               </a:rPr>
-              <a:t>MAP BY MEDIAN VALUE&amp; MEDIAN INCOME</a:t>
+              <a:t>(Tooltip on movies name, </a:t>
             </a:r>
           </a:p>
           <a:p>
@@ -4367,7 +5870,7 @@
                 <a:latin typeface="MV Boli" panose="02000500030200090000" pitchFamily="2" charset="0"/>
                 <a:cs typeface="MV Boli" panose="02000500030200090000" pitchFamily="2" charset="0"/>
               </a:rPr>
-              <a:t>(Tooltip on point for summarized records)</a:t>
+              <a:t>Studios, etc.)</a:t>
             </a:r>
           </a:p>
           <a:p>
@@ -4393,7 +5896,7 @@
         </p:nvSpPr>
         <p:spPr>
           <a:xfrm rot="16200000">
-            <a:off x="3166018" y="2922367"/>
+            <a:off x="3120955" y="2685228"/>
             <a:ext cx="244720" cy="338554"/>
           </a:xfrm>
           <a:prstGeom prst="actionButtonBackPrevious">
@@ -4423,71 +5926,6 @@
           </a:p>
         </p:txBody>
       </p:sp>
-      <p:sp>
-        <p:nvSpPr>
-          <p:cNvPr id="42" name="Flowchart: Process 41">
-            <a:extLst>
-              <a:ext uri="{FF2B5EF4-FFF2-40B4-BE49-F238E27FC236}">
-                <a16:creationId xmlns:a16="http://schemas.microsoft.com/office/drawing/2014/main" id="{F14D5336-99D4-4D48-955E-FEC36C884A0B}"/>
-              </a:ext>
-            </a:extLst>
-          </p:cNvPr>
-          <p:cNvSpPr/>
-          <p:nvPr/>
-        </p:nvSpPr>
-        <p:spPr>
-          <a:xfrm>
-            <a:off x="7561674" y="3633664"/>
-            <a:ext cx="2770471" cy="449353"/>
-          </a:xfrm>
-          <a:prstGeom prst="flowChartProcess">
-            <a:avLst/>
-          </a:prstGeom>
-          <a:solidFill>
-            <a:schemeClr val="accent1">
-              <a:lumMod val="50000"/>
-            </a:schemeClr>
-          </a:solidFill>
-        </p:spPr>
-        <p:style>
-          <a:lnRef idx="2">
-            <a:schemeClr val="accent1">
-              <a:shade val="50000"/>
-            </a:schemeClr>
-          </a:lnRef>
-          <a:fillRef idx="1">
-            <a:schemeClr val="accent1"/>
-          </a:fillRef>
-          <a:effectRef idx="0">
-            <a:schemeClr val="accent1"/>
-          </a:effectRef>
-          <a:fontRef idx="minor">
-            <a:schemeClr val="lt1"/>
-          </a:fontRef>
-        </p:style>
-        <p:txBody>
-          <a:bodyPr rtlCol="0" anchor="ctr"/>
-          <a:lstStyle/>
-          <a:p>
-            <a:pPr algn="ctr"/>
-            <a:r>
-              <a:rPr lang="en-US" sz="1500" dirty="0">
-                <a:solidFill>
-                  <a:schemeClr val="bg1"/>
-                </a:solidFill>
-                <a:latin typeface="Arial Nova Light" panose="020B0304020202020204" pitchFamily="34" charset="0"/>
-              </a:rPr>
-              <a:t>Top 10 records by median income</a:t>
-            </a:r>
-            <a:endParaRPr lang="en-SG" sz="1500" dirty="0">
-              <a:solidFill>
-                <a:schemeClr val="bg1"/>
-              </a:solidFill>
-              <a:latin typeface="Arial Nova Light" panose="020B0304020202020204" pitchFamily="34" charset="0"/>
-            </a:endParaRPr>
-          </a:p>
-        </p:txBody>
-      </p:sp>
       <p:graphicFrame>
         <p:nvGraphicFramePr>
           <p:cNvPr id="45" name="Table 45">
@@ -4503,14 +5941,14 @@
           <p:nvPr>
             <p:extLst>
               <p:ext uri="{D42A27DB-BD31-4B8C-83A1-F6EECF244321}">
-                <p14:modId xmlns:p14="http://schemas.microsoft.com/office/powerpoint/2010/main" val="3743274850"/>
+                <p14:modId xmlns:p14="http://schemas.microsoft.com/office/powerpoint/2010/main" val="2752517776"/>
               </p:ext>
             </p:extLst>
           </p:nvPr>
         </p:nvGraphicFramePr>
         <p:xfrm>
-          <a:off x="7561673" y="4139886"/>
-          <a:ext cx="2713296" cy="1812232"/>
+          <a:off x="8054481" y="3799130"/>
+          <a:ext cx="2984283" cy="2483490"/>
         </p:xfrm>
         <a:graphic>
           <a:graphicData uri="http://schemas.openxmlformats.org/drawingml/2006/table">
@@ -4519,36 +5957,43 @@
                 <a:tableStyleId>{9D7B26C5-4107-4FEC-AEDC-1716B250A1EF}</a:tableStyleId>
               </a:tblPr>
               <a:tblGrid>
-                <a:gridCol w="678324">
+                <a:gridCol w="431262">
                   <a:extLst>
                     <a:ext uri="{9D8B030D-6E8A-4147-A177-3AD203B41FA5}">
                       <a16:colId xmlns:a16="http://schemas.microsoft.com/office/drawing/2014/main" val="1943875583"/>
                     </a:ext>
                   </a:extLst>
                 </a:gridCol>
-                <a:gridCol w="678324">
+                <a:gridCol w="620193">
                   <a:extLst>
                     <a:ext uri="{9D8B030D-6E8A-4147-A177-3AD203B41FA5}">
                       <a16:colId xmlns:a16="http://schemas.microsoft.com/office/drawing/2014/main" val="3049575308"/>
                     </a:ext>
                   </a:extLst>
                 </a:gridCol>
-                <a:gridCol w="678324">
+                <a:gridCol w="739116">
+                  <a:extLst>
+                    <a:ext uri="{9D8B030D-6E8A-4147-A177-3AD203B41FA5}">
+                      <a16:colId xmlns:a16="http://schemas.microsoft.com/office/drawing/2014/main" val="1023602021"/>
+                    </a:ext>
+                  </a:extLst>
+                </a:gridCol>
+                <a:gridCol w="596856">
+                  <a:extLst>
+                    <a:ext uri="{9D8B030D-6E8A-4147-A177-3AD203B41FA5}">
+                      <a16:colId xmlns:a16="http://schemas.microsoft.com/office/drawing/2014/main" val="605394767"/>
+                    </a:ext>
+                  </a:extLst>
+                </a:gridCol>
+                <a:gridCol w="596856">
                   <a:extLst>
                     <a:ext uri="{9D8B030D-6E8A-4147-A177-3AD203B41FA5}">
                       <a16:colId xmlns:a16="http://schemas.microsoft.com/office/drawing/2014/main" val="1898367818"/>
                     </a:ext>
                   </a:extLst>
                 </a:gridCol>
-                <a:gridCol w="678324">
-                  <a:extLst>
-                    <a:ext uri="{9D8B030D-6E8A-4147-A177-3AD203B41FA5}">
-                      <a16:colId xmlns:a16="http://schemas.microsoft.com/office/drawing/2014/main" val="3359960683"/>
-                    </a:ext>
-                  </a:extLst>
-                </a:gridCol>
               </a:tblGrid>
-              <a:tr h="505791">
+              <a:tr h="662814">
                 <a:tc>
                   <a:txBody>
                     <a:bodyPr/>
@@ -4566,7 +6011,7 @@
                     <a:p>
                       <a:r>
                         <a:rPr lang="en-US" sz="1200" dirty="0"/>
-                        <a:t>Median House Value</a:t>
+                        <a:t>Name</a:t>
                       </a:r>
                       <a:endParaRPr lang="en-SG" sz="1200" dirty="0"/>
                     </a:p>
@@ -4580,7 +6025,7 @@
                     <a:p>
                       <a:r>
                         <a:rPr lang="en-US" sz="1200" dirty="0"/>
-                        <a:t>Avg rooms</a:t>
+                        <a:t>Profit</a:t>
                       </a:r>
                       <a:endParaRPr lang="en-SG" sz="1200" dirty="0"/>
                     </a:p>
@@ -4594,7 +6039,21 @@
                     <a:p>
                       <a:r>
                         <a:rPr lang="en-US" sz="1200" dirty="0"/>
-                        <a:t>Population</a:t>
+                        <a:t>Run time</a:t>
+                      </a:r>
+                      <a:endParaRPr lang="en-SG" sz="1200" dirty="0"/>
+                    </a:p>
+                  </a:txBody>
+                  <a:tcPr/>
+                </a:tc>
+                <a:tc>
+                  <a:txBody>
+                    <a:bodyPr/>
+                    <a:lstStyle/>
+                    <a:p>
+                      <a:r>
+                        <a:rPr lang="en-US" sz="1200" dirty="0"/>
+                        <a:t>Vote average</a:t>
                       </a:r>
                       <a:endParaRPr lang="en-SG" sz="1200" dirty="0"/>
                     </a:p>
@@ -4607,7 +6066,7 @@
                   </a:ext>
                 </a:extLst>
               </a:tr>
-              <a:tr h="293038">
+              <a:tr h="303446">
                 <a:tc>
                   <a:txBody>
                     <a:bodyPr/>
@@ -4637,7 +6096,17 @@
                     <a:bodyPr/>
                     <a:lstStyle/>
                     <a:p>
-                      <a:endParaRPr lang="en-SG" sz="1200"/>
+                      <a:endParaRPr lang="en-SG" sz="1200" dirty="0"/>
+                    </a:p>
+                  </a:txBody>
+                  <a:tcPr/>
+                </a:tc>
+                <a:tc>
+                  <a:txBody>
+                    <a:bodyPr/>
+                    <a:lstStyle/>
+                    <a:p>
+                      <a:endParaRPr lang="en-SG" sz="1200" dirty="0"/>
                     </a:p>
                   </a:txBody>
                   <a:tcPr/>
@@ -4658,7 +6127,7 @@
                   </a:ext>
                 </a:extLst>
               </a:tr>
-              <a:tr h="293038">
+              <a:tr h="303446">
                 <a:tc>
                   <a:txBody>
                     <a:bodyPr/>
@@ -4703,13 +6172,23 @@
                   </a:txBody>
                   <a:tcPr/>
                 </a:tc>
+                <a:tc>
+                  <a:txBody>
+                    <a:bodyPr/>
+                    <a:lstStyle/>
+                    <a:p>
+                      <a:endParaRPr lang="en-SG" sz="1200" dirty="0"/>
+                    </a:p>
+                  </a:txBody>
+                  <a:tcPr/>
+                </a:tc>
                 <a:extLst>
                   <a:ext uri="{0D108BD9-81ED-4DB2-BD59-A6C34878D82A}">
                     <a16:rowId xmlns:a16="http://schemas.microsoft.com/office/drawing/2014/main" val="2400692478"/>
                   </a:ext>
                 </a:extLst>
               </a:tr>
-              <a:tr h="293038">
+              <a:tr h="303446">
                 <a:tc>
                   <a:txBody>
                     <a:bodyPr/>
@@ -4754,13 +6233,23 @@
                   </a:txBody>
                   <a:tcPr/>
                 </a:tc>
+                <a:tc>
+                  <a:txBody>
+                    <a:bodyPr/>
+                    <a:lstStyle/>
+                    <a:p>
+                      <a:endParaRPr lang="en-SG" sz="1200" dirty="0"/>
+                    </a:p>
+                  </a:txBody>
+                  <a:tcPr/>
+                </a:tc>
                 <a:extLst>
                   <a:ext uri="{0D108BD9-81ED-4DB2-BD59-A6C34878D82A}">
                     <a16:rowId xmlns:a16="http://schemas.microsoft.com/office/drawing/2014/main" val="2530686321"/>
                   </a:ext>
                 </a:extLst>
               </a:tr>
-              <a:tr h="293038">
+              <a:tr h="303446">
                 <a:tc>
                   <a:txBody>
                     <a:bodyPr/>
@@ -4805,9 +6294,141 @@
                   </a:txBody>
                   <a:tcPr/>
                 </a:tc>
+                <a:tc>
+                  <a:txBody>
+                    <a:bodyPr/>
+                    <a:lstStyle/>
+                    <a:p>
+                      <a:endParaRPr lang="en-SG" sz="1200" dirty="0"/>
+                    </a:p>
+                  </a:txBody>
+                  <a:tcPr/>
+                </a:tc>
                 <a:extLst>
                   <a:ext uri="{0D108BD9-81ED-4DB2-BD59-A6C34878D82A}">
                     <a16:rowId xmlns:a16="http://schemas.microsoft.com/office/drawing/2014/main" val="1389739460"/>
+                  </a:ext>
+                </a:extLst>
+              </a:tr>
+              <a:tr h="303446">
+                <a:tc>
+                  <a:txBody>
+                    <a:bodyPr/>
+                    <a:lstStyle/>
+                    <a:p>
+                      <a:r>
+                        <a:rPr lang="en-US" sz="1200" dirty="0"/>
+                        <a:t>5</a:t>
+                      </a:r>
+                      <a:endParaRPr lang="en-SG" sz="1200" dirty="0"/>
+                    </a:p>
+                  </a:txBody>
+                  <a:tcPr/>
+                </a:tc>
+                <a:tc>
+                  <a:txBody>
+                    <a:bodyPr/>
+                    <a:lstStyle/>
+                    <a:p>
+                      <a:endParaRPr lang="en-SG" sz="1200" dirty="0"/>
+                    </a:p>
+                  </a:txBody>
+                  <a:tcPr/>
+                </a:tc>
+                <a:tc>
+                  <a:txBody>
+                    <a:bodyPr/>
+                    <a:lstStyle/>
+                    <a:p>
+                      <a:endParaRPr lang="en-SG" sz="1200" dirty="0"/>
+                    </a:p>
+                  </a:txBody>
+                  <a:tcPr/>
+                </a:tc>
+                <a:tc>
+                  <a:txBody>
+                    <a:bodyPr/>
+                    <a:lstStyle/>
+                    <a:p>
+                      <a:endParaRPr lang="en-SG" sz="1200" dirty="0"/>
+                    </a:p>
+                  </a:txBody>
+                  <a:tcPr/>
+                </a:tc>
+                <a:tc>
+                  <a:txBody>
+                    <a:bodyPr/>
+                    <a:lstStyle/>
+                    <a:p>
+                      <a:endParaRPr lang="en-SG" sz="1200" dirty="0"/>
+                    </a:p>
+                  </a:txBody>
+                  <a:tcPr/>
+                </a:tc>
+                <a:extLst>
+                  <a:ext uri="{0D108BD9-81ED-4DB2-BD59-A6C34878D82A}">
+                    <a16:rowId xmlns:a16="http://schemas.microsoft.com/office/drawing/2014/main" val="2632962815"/>
+                  </a:ext>
+                </a:extLst>
+              </a:tr>
+              <a:tr h="303446">
+                <a:tc>
+                  <a:txBody>
+                    <a:bodyPr/>
+                    <a:lstStyle/>
+                    <a:p>
+                      <a:r>
+                        <a:rPr lang="en-US" sz="1200" dirty="0"/>
+                        <a:t>6</a:t>
+                      </a:r>
+                      <a:endParaRPr lang="en-SG" sz="1200" dirty="0"/>
+                    </a:p>
+                  </a:txBody>
+                  <a:tcPr/>
+                </a:tc>
+                <a:tc>
+                  <a:txBody>
+                    <a:bodyPr/>
+                    <a:lstStyle/>
+                    <a:p>
+                      <a:endParaRPr lang="en-SG" sz="1200" dirty="0"/>
+                    </a:p>
+                  </a:txBody>
+                  <a:tcPr/>
+                </a:tc>
+                <a:tc>
+                  <a:txBody>
+                    <a:bodyPr/>
+                    <a:lstStyle/>
+                    <a:p>
+                      <a:endParaRPr lang="en-SG" sz="1200" dirty="0"/>
+                    </a:p>
+                  </a:txBody>
+                  <a:tcPr/>
+                </a:tc>
+                <a:tc>
+                  <a:txBody>
+                    <a:bodyPr/>
+                    <a:lstStyle/>
+                    <a:p>
+                      <a:endParaRPr lang="en-SG" sz="1200" dirty="0"/>
+                    </a:p>
+                  </a:txBody>
+                  <a:tcPr/>
+                </a:tc>
+                <a:tc>
+                  <a:txBody>
+                    <a:bodyPr/>
+                    <a:lstStyle/>
+                    <a:p>
+                      <a:endParaRPr lang="en-SG" sz="1200" dirty="0"/>
+                    </a:p>
+                  </a:txBody>
+                  <a:tcPr/>
+                </a:tc>
+                <a:extLst>
+                  <a:ext uri="{0D108BD9-81ED-4DB2-BD59-A6C34878D82A}">
+                    <a16:rowId xmlns:a16="http://schemas.microsoft.com/office/drawing/2014/main" val="1826958259"/>
                   </a:ext>
                 </a:extLst>
               </a:tr>
@@ -4817,10 +6438,10 @@
       </p:graphicFrame>
       <p:sp>
         <p:nvSpPr>
-          <p:cNvPr id="46" name="Flowchart: Process 45">
-            <a:extLst>
-              <a:ext uri="{FF2B5EF4-FFF2-40B4-BE49-F238E27FC236}">
-                <a16:creationId xmlns:a16="http://schemas.microsoft.com/office/drawing/2014/main" id="{468ED40E-6192-46E5-A70D-06F4D9FE9D6B}"/>
+          <p:cNvPr id="47" name="Flowchart: Process 46">
+            <a:extLst>
+              <a:ext uri="{FF2B5EF4-FFF2-40B4-BE49-F238E27FC236}">
+                <a16:creationId xmlns:a16="http://schemas.microsoft.com/office/drawing/2014/main" id="{EFEC2108-BEAB-470F-8CCF-64245A9638AE}"/>
               </a:ext>
             </a:extLst>
           </p:cNvPr>
@@ -4829,8 +6450,8 @@
         </p:nvSpPr>
         <p:spPr>
           <a:xfrm>
-            <a:off x="1479666" y="3404137"/>
-            <a:ext cx="2211185" cy="1290199"/>
+            <a:off x="1499006" y="3982190"/>
+            <a:ext cx="2284041" cy="937418"/>
           </a:xfrm>
           <a:prstGeom prst="flowChartProcess">
             <a:avLst/>
@@ -4857,28 +6478,31 @@
           <a:lstStyle/>
           <a:p>
             <a:r>
-              <a:rPr lang="en-US" dirty="0"/>
-              <a:t>Average median income</a:t>
-            </a:r>
-          </a:p>
-          <a:p>
-            <a:r>
-              <a:rPr lang="en-US" sz="2800" dirty="0"/>
-              <a:t>$64,453</a:t>
-            </a:r>
-          </a:p>
-          <a:p>
-            <a:pPr algn="ctr"/>
-            <a:endParaRPr lang="en-SG" dirty="0"/>
-          </a:p>
-        </p:txBody>
-      </p:sp>
-      <p:sp>
-        <p:nvSpPr>
-          <p:cNvPr id="47" name="Flowchart: Process 46">
-            <a:extLst>
-              <a:ext uri="{FF2B5EF4-FFF2-40B4-BE49-F238E27FC236}">
-                <a16:creationId xmlns:a16="http://schemas.microsoft.com/office/drawing/2014/main" id="{EFEC2108-BEAB-470F-8CCF-64245A9638AE}"/>
+              <a:rPr lang="en-US" dirty="0">
+                <a:latin typeface="Arial Nova Light" panose="020B0304020202020204" pitchFamily="34" charset="0"/>
+              </a:rPr>
+              <a:t>Average box office value</a:t>
+            </a:r>
+          </a:p>
+          <a:p>
+            <a:r>
+              <a:rPr lang="en-SG" sz="2800" dirty="0">
+                <a:latin typeface="Arial Nova Light" panose="020B0304020202020204" pitchFamily="34" charset="0"/>
+              </a:rPr>
+              <a:t>$123,238</a:t>
+            </a:r>
+            <a:endParaRPr lang="en-US" sz="2800" dirty="0">
+              <a:latin typeface="Arial Nova Light" panose="020B0304020202020204" pitchFamily="34" charset="0"/>
+            </a:endParaRPr>
+          </a:p>
+        </p:txBody>
+      </p:sp>
+      <p:sp>
+        <p:nvSpPr>
+          <p:cNvPr id="33" name="Flowchart: Process 32">
+            <a:extLst>
+              <a:ext uri="{FF2B5EF4-FFF2-40B4-BE49-F238E27FC236}">
+                <a16:creationId xmlns:a16="http://schemas.microsoft.com/office/drawing/2014/main" id="{10A84354-97AC-4BA1-880B-1ECC7A8EA42F}"/>
               </a:ext>
             </a:extLst>
           </p:cNvPr>
@@ -4887,8 +6511,272 @@
         </p:nvSpPr>
         <p:spPr>
           <a:xfrm>
-            <a:off x="1454727" y="4814630"/>
-            <a:ext cx="2260038" cy="1290199"/>
+            <a:off x="8907349" y="491614"/>
+            <a:ext cx="2278248" cy="225656"/>
+          </a:xfrm>
+          <a:prstGeom prst="flowChartProcess">
+            <a:avLst/>
+          </a:prstGeom>
+          <a:noFill/>
+          <a:ln w="28575">
+            <a:solidFill>
+              <a:schemeClr val="bg2">
+                <a:lumMod val="75000"/>
+              </a:schemeClr>
+            </a:solidFill>
+          </a:ln>
+        </p:spPr>
+        <p:style>
+          <a:lnRef idx="2">
+            <a:schemeClr val="accent1">
+              <a:shade val="50000"/>
+            </a:schemeClr>
+          </a:lnRef>
+          <a:fillRef idx="1">
+            <a:schemeClr val="accent1"/>
+          </a:fillRef>
+          <a:effectRef idx="0">
+            <a:schemeClr val="accent1"/>
+          </a:effectRef>
+          <a:fontRef idx="minor">
+            <a:schemeClr val="lt1"/>
+          </a:fontRef>
+        </p:style>
+        <p:txBody>
+          <a:bodyPr rtlCol="0" anchor="ctr"/>
+          <a:lstStyle/>
+          <a:p>
+            <a:r>
+              <a:rPr lang="en-US" sz="1200" dirty="0">
+                <a:solidFill>
+                  <a:schemeClr val="tx1"/>
+                </a:solidFill>
+                <a:latin typeface="Arial Nova Light" panose="020B0304020202020204" pitchFamily="34" charset="0"/>
+              </a:rPr>
+              <a:t>Studios</a:t>
+            </a:r>
+            <a:endParaRPr lang="en-SG" sz="1200" dirty="0">
+              <a:solidFill>
+                <a:schemeClr val="tx1"/>
+              </a:solidFill>
+              <a:latin typeface="Arial Nova Light" panose="020B0304020202020204" pitchFamily="34" charset="0"/>
+            </a:endParaRPr>
+          </a:p>
+        </p:txBody>
+      </p:sp>
+      <p:sp>
+        <p:nvSpPr>
+          <p:cNvPr id="36" name="Action Button: Go Back or Previous 35">
+            <a:hlinkClick r:id="" action="ppaction://hlinkshowjump?jump=previousslide" highlightClick="1"/>
+            <a:extLst>
+              <a:ext uri="{FF2B5EF4-FFF2-40B4-BE49-F238E27FC236}">
+                <a16:creationId xmlns:a16="http://schemas.microsoft.com/office/drawing/2014/main" id="{707393FE-6E3B-4FEF-B5FD-5307E594345D}"/>
+              </a:ext>
+            </a:extLst>
+          </p:cNvPr>
+          <p:cNvSpPr/>
+          <p:nvPr/>
+        </p:nvSpPr>
+        <p:spPr>
+          <a:xfrm rot="16200000">
+            <a:off x="10917060" y="445867"/>
+            <a:ext cx="184495" cy="322538"/>
+          </a:xfrm>
+          <a:prstGeom prst="actionButtonBackPrevious">
+            <a:avLst/>
+          </a:prstGeom>
+        </p:spPr>
+        <p:style>
+          <a:lnRef idx="1">
+            <a:schemeClr val="accent3"/>
+          </a:lnRef>
+          <a:fillRef idx="2">
+            <a:schemeClr val="accent3"/>
+          </a:fillRef>
+          <a:effectRef idx="1">
+            <a:schemeClr val="accent3"/>
+          </a:effectRef>
+          <a:fontRef idx="minor">
+            <a:schemeClr val="dk1"/>
+          </a:fontRef>
+        </p:style>
+        <p:txBody>
+          <a:bodyPr rtlCol="0" anchor="ctr"/>
+          <a:lstStyle/>
+          <a:p>
+            <a:pPr algn="ctr"/>
+            <a:endParaRPr lang="en-SG"/>
+          </a:p>
+        </p:txBody>
+      </p:sp>
+      <p:sp>
+        <p:nvSpPr>
+          <p:cNvPr id="39" name="Flowchart: Process 38">
+            <a:extLst>
+              <a:ext uri="{FF2B5EF4-FFF2-40B4-BE49-F238E27FC236}">
+                <a16:creationId xmlns:a16="http://schemas.microsoft.com/office/drawing/2014/main" id="{C9F5D1EC-248C-4E0F-9ED2-4398CB1661F1}"/>
+              </a:ext>
+            </a:extLst>
+          </p:cNvPr>
+          <p:cNvSpPr/>
+          <p:nvPr/>
+        </p:nvSpPr>
+        <p:spPr>
+          <a:xfrm>
+            <a:off x="1550981" y="3474700"/>
+            <a:ext cx="1949261" cy="338554"/>
+          </a:xfrm>
+          <a:prstGeom prst="flowChartProcess">
+            <a:avLst/>
+          </a:prstGeom>
+          <a:noFill/>
+          <a:ln w="28575">
+            <a:solidFill>
+              <a:schemeClr val="bg2">
+                <a:lumMod val="75000"/>
+              </a:schemeClr>
+            </a:solidFill>
+          </a:ln>
+        </p:spPr>
+        <p:style>
+          <a:lnRef idx="2">
+            <a:schemeClr val="accent1">
+              <a:shade val="50000"/>
+            </a:schemeClr>
+          </a:lnRef>
+          <a:fillRef idx="1">
+            <a:schemeClr val="accent1"/>
+          </a:fillRef>
+          <a:effectRef idx="0">
+            <a:schemeClr val="accent1"/>
+          </a:effectRef>
+          <a:fontRef idx="minor">
+            <a:schemeClr val="lt1"/>
+          </a:fontRef>
+        </p:style>
+        <p:txBody>
+          <a:bodyPr rtlCol="0" anchor="ctr"/>
+          <a:lstStyle/>
+          <a:p>
+            <a:pPr algn="ctr"/>
+            <a:endParaRPr lang="en-SG"/>
+          </a:p>
+        </p:txBody>
+      </p:sp>
+      <p:sp>
+        <p:nvSpPr>
+          <p:cNvPr id="40" name="TextBox 39">
+            <a:extLst>
+              <a:ext uri="{FF2B5EF4-FFF2-40B4-BE49-F238E27FC236}">
+                <a16:creationId xmlns:a16="http://schemas.microsoft.com/office/drawing/2014/main" id="{03BB737D-395E-476B-8973-E1D173916A8F}"/>
+              </a:ext>
+            </a:extLst>
+          </p:cNvPr>
+          <p:cNvSpPr txBox="1"/>
+          <p:nvPr/>
+        </p:nvSpPr>
+        <p:spPr>
+          <a:xfrm>
+            <a:off x="1480265" y="3134165"/>
+            <a:ext cx="1949261" cy="338554"/>
+          </a:xfrm>
+          <a:prstGeom prst="rect">
+            <a:avLst/>
+          </a:prstGeom>
+          <a:noFill/>
+        </p:spPr>
+        <p:txBody>
+          <a:bodyPr wrap="square">
+            <a:spAutoFit/>
+          </a:bodyPr>
+          <a:lstStyle/>
+          <a:p>
+            <a:r>
+              <a:rPr lang="en-US" sz="1600" dirty="0">
+                <a:latin typeface="Arial Nova Light" panose="020B0304020202020204" pitchFamily="34" charset="0"/>
+              </a:rPr>
+              <a:t>Budget</a:t>
+            </a:r>
+            <a:endParaRPr lang="en-SG" sz="1600" dirty="0">
+              <a:latin typeface="Arial Nova Light" panose="020B0304020202020204" pitchFamily="34" charset="0"/>
+            </a:endParaRPr>
+          </a:p>
+        </p:txBody>
+      </p:sp>
+      <p:sp>
+        <p:nvSpPr>
+          <p:cNvPr id="4" name="Rectangle 3">
+            <a:extLst>
+              <a:ext uri="{FF2B5EF4-FFF2-40B4-BE49-F238E27FC236}">
+                <a16:creationId xmlns:a16="http://schemas.microsoft.com/office/drawing/2014/main" id="{1FBD5C25-EB2E-400D-88AB-3553633FA5B3}"/>
+              </a:ext>
+            </a:extLst>
+          </p:cNvPr>
+          <p:cNvSpPr/>
+          <p:nvPr/>
+        </p:nvSpPr>
+        <p:spPr>
+          <a:xfrm>
+            <a:off x="2279160" y="3544633"/>
+            <a:ext cx="377505" cy="225346"/>
+          </a:xfrm>
+          <a:prstGeom prst="rect">
+            <a:avLst/>
+          </a:prstGeom>
+          <a:solidFill>
+            <a:schemeClr val="bg2">
+              <a:lumMod val="75000"/>
+            </a:schemeClr>
+          </a:solidFill>
+          <a:ln>
+            <a:solidFill>
+              <a:schemeClr val="bg2">
+                <a:lumMod val="75000"/>
+              </a:schemeClr>
+            </a:solidFill>
+          </a:ln>
+        </p:spPr>
+        <p:style>
+          <a:lnRef idx="2">
+            <a:schemeClr val="accent1">
+              <a:shade val="50000"/>
+            </a:schemeClr>
+          </a:lnRef>
+          <a:fillRef idx="1">
+            <a:schemeClr val="accent1"/>
+          </a:fillRef>
+          <a:effectRef idx="0">
+            <a:schemeClr val="accent1"/>
+          </a:effectRef>
+          <a:fontRef idx="minor">
+            <a:schemeClr val="lt1"/>
+          </a:fontRef>
+        </p:style>
+        <p:txBody>
+          <a:bodyPr rtlCol="0" anchor="ctr"/>
+          <a:lstStyle/>
+          <a:p>
+            <a:pPr algn="ctr"/>
+            <a:endParaRPr lang="en-SG"/>
+          </a:p>
+        </p:txBody>
+      </p:sp>
+      <p:sp>
+        <p:nvSpPr>
+          <p:cNvPr id="57" name="Flowchart: Process 56">
+            <a:extLst>
+              <a:ext uri="{FF2B5EF4-FFF2-40B4-BE49-F238E27FC236}">
+                <a16:creationId xmlns:a16="http://schemas.microsoft.com/office/drawing/2014/main" id="{4D2CBB96-93CE-4C68-A616-00FC20D2CA02}"/>
+              </a:ext>
+            </a:extLst>
+          </p:cNvPr>
+          <p:cNvSpPr/>
+          <p:nvPr/>
+        </p:nvSpPr>
+        <p:spPr>
+          <a:xfrm>
+            <a:off x="1500076" y="5114411"/>
+            <a:ext cx="2284041" cy="937418"/>
           </a:xfrm>
           <a:prstGeom prst="flowChartProcess">
             <a:avLst/>
@@ -4915,265 +6803,134 @@
           <a:lstStyle/>
           <a:p>
             <a:r>
-              <a:rPr lang="en-US" dirty="0"/>
-              <a:t>Average median house value</a:t>
-            </a:r>
-          </a:p>
-          <a:p>
-            <a:r>
-              <a:rPr lang="en-SG" sz="2800" dirty="0"/>
+              <a:rPr lang="en-US" dirty="0">
+                <a:latin typeface="Arial Nova Light" panose="020B0304020202020204" pitchFamily="34" charset="0"/>
+              </a:rPr>
+              <a:t>Average profit</a:t>
+            </a:r>
+          </a:p>
+          <a:p>
+            <a:r>
+              <a:rPr lang="en-SG" sz="2800" dirty="0">
+                <a:latin typeface="Arial Nova Light" panose="020B0304020202020204" pitchFamily="34" charset="0"/>
+              </a:rPr>
               <a:t>$123,238</a:t>
             </a:r>
-            <a:endParaRPr lang="en-US" sz="2800" dirty="0"/>
-          </a:p>
-        </p:txBody>
-      </p:sp>
-    </p:spTree>
-    <p:extLst>
-      <p:ext uri="{BB962C8B-B14F-4D97-AF65-F5344CB8AC3E}">
-        <p14:creationId xmlns:p14="http://schemas.microsoft.com/office/powerpoint/2010/main" val="2349793763"/>
-      </p:ext>
-    </p:extLst>
-  </p:cSld>
-  <p:clrMapOvr>
-    <a:masterClrMapping/>
-  </p:clrMapOvr>
-</p:sld>
-</file>
-
-<file path=ppt/slides/slide2.xml><?xml version="1.0" encoding="utf-8"?>
-<p:sld xmlns:a="http://schemas.openxmlformats.org/drawingml/2006/main" xmlns:r="http://schemas.openxmlformats.org/officeDocument/2006/relationships" xmlns:p="http://schemas.openxmlformats.org/presentationml/2006/main">
-  <p:cSld>
-    <p:spTree>
-      <p:nvGrpSpPr>
-        <p:cNvPr id="1" name=""/>
-        <p:cNvGrpSpPr/>
-        <p:nvPr/>
-      </p:nvGrpSpPr>
-      <p:grpSpPr>
-        <a:xfrm>
-          <a:off x="0" y="0"/>
-          <a:ext cx="0" cy="0"/>
-          <a:chOff x="0" y="0"/>
-          <a:chExt cx="0" cy="0"/>
-        </a:xfrm>
-      </p:grpSpPr>
-      <p:sp>
-        <p:nvSpPr>
-          <p:cNvPr id="2" name="Title 1">
-            <a:extLst>
-              <a:ext uri="{FF2B5EF4-FFF2-40B4-BE49-F238E27FC236}">
-                <a16:creationId xmlns:a16="http://schemas.microsoft.com/office/drawing/2014/main" id="{105B7305-F899-4EFB-8EC8-BF3EBB4BBD7C}"/>
-              </a:ext>
-            </a:extLst>
-          </p:cNvPr>
-          <p:cNvSpPr>
-            <a:spLocks noGrp="1"/>
-          </p:cNvSpPr>
+            <a:endParaRPr lang="en-US" sz="2800" dirty="0">
+              <a:latin typeface="Arial Nova Light" panose="020B0304020202020204" pitchFamily="34" charset="0"/>
+            </a:endParaRPr>
+          </a:p>
+        </p:txBody>
+      </p:sp>
+      <p:graphicFrame>
+        <p:nvGraphicFramePr>
+          <p:cNvPr id="12" name="Chart 11">
+            <a:extLst>
+              <a:ext uri="{FF2B5EF4-FFF2-40B4-BE49-F238E27FC236}">
+                <a16:creationId xmlns:a16="http://schemas.microsoft.com/office/drawing/2014/main" id="{7680ABEC-F98E-4744-9EFB-1B58D41CD4D5}"/>
+              </a:ext>
+            </a:extLst>
+          </p:cNvPr>
+          <p:cNvGraphicFramePr/>
           <p:nvPr>
-            <p:ph type="title"/>
+            <p:extLst>
+              <p:ext uri="{D42A27DB-BD31-4B8C-83A1-F6EECF244321}">
+                <p14:modId xmlns:p14="http://schemas.microsoft.com/office/powerpoint/2010/main" val="4274240916"/>
+              </p:ext>
+            </p:extLst>
           </p:nvPr>
+        </p:nvGraphicFramePr>
+        <p:xfrm>
+          <a:off x="3951267" y="480661"/>
+          <a:ext cx="3359906" cy="2510126"/>
+        </p:xfrm>
+        <a:graphic>
+          <a:graphicData uri="http://schemas.openxmlformats.org/drawingml/2006/chart">
+            <c:chart xmlns:c="http://schemas.openxmlformats.org/drawingml/2006/chart" xmlns:r="http://schemas.openxmlformats.org/officeDocument/2006/relationships" r:id="rId2"/>
+          </a:graphicData>
+        </a:graphic>
+      </p:graphicFrame>
+      <p:sp>
+        <p:nvSpPr>
+          <p:cNvPr id="58" name="Rectangle 57">
+            <a:extLst>
+              <a:ext uri="{FF2B5EF4-FFF2-40B4-BE49-F238E27FC236}">
+                <a16:creationId xmlns:a16="http://schemas.microsoft.com/office/drawing/2014/main" id="{1E727112-6972-4303-B267-D9A978F57D22}"/>
+              </a:ext>
+            </a:extLst>
+          </p:cNvPr>
+          <p:cNvSpPr/>
+          <p:nvPr/>
         </p:nvSpPr>
         <p:spPr>
           <a:xfrm>
-            <a:off x="838200" y="365125"/>
-            <a:ext cx="6300537" cy="1325563"/>
+            <a:off x="3904630" y="430961"/>
+            <a:ext cx="4037733" cy="2791779"/>
           </a:xfrm>
+          <a:prstGeom prst="rect">
+            <a:avLst/>
+          </a:prstGeom>
+          <a:noFill/>
         </p:spPr>
-        <p:txBody>
-          <a:bodyPr/>
-          <a:lstStyle/>
-          <a:p>
-            <a:r>
-              <a:rPr lang="en-US" dirty="0"/>
-              <a:t>Summarized records for tool tip</a:t>
-            </a:r>
-            <a:endParaRPr lang="en-SG" dirty="0"/>
-          </a:p>
-        </p:txBody>
-      </p:sp>
-      <p:sp>
-        <p:nvSpPr>
-          <p:cNvPr id="3" name="Content Placeholder 2">
-            <a:extLst>
-              <a:ext uri="{FF2B5EF4-FFF2-40B4-BE49-F238E27FC236}">
-                <a16:creationId xmlns:a16="http://schemas.microsoft.com/office/drawing/2014/main" id="{9B166FB6-8937-4306-A6E5-5885AD5C91AB}"/>
-              </a:ext>
-            </a:extLst>
-          </p:cNvPr>
-          <p:cNvSpPr>
-            <a:spLocks noGrp="1"/>
-          </p:cNvSpPr>
+        <p:style>
+          <a:lnRef idx="2">
+            <a:schemeClr val="accent1">
+              <a:shade val="50000"/>
+            </a:schemeClr>
+          </a:lnRef>
+          <a:fillRef idx="1">
+            <a:schemeClr val="accent1"/>
+          </a:fillRef>
+          <a:effectRef idx="0">
+            <a:schemeClr val="accent1"/>
+          </a:effectRef>
+          <a:fontRef idx="minor">
+            <a:schemeClr val="lt1"/>
+          </a:fontRef>
+        </p:style>
+        <p:txBody>
+          <a:bodyPr rtlCol="0" anchor="ctr"/>
+          <a:lstStyle/>
+          <a:p>
+            <a:pPr algn="ctr"/>
+            <a:endParaRPr lang="en-SG"/>
+          </a:p>
+        </p:txBody>
+      </p:sp>
+      <p:graphicFrame>
+        <p:nvGraphicFramePr>
+          <p:cNvPr id="16" name="Chart 15">
+            <a:extLst>
+              <a:ext uri="{FF2B5EF4-FFF2-40B4-BE49-F238E27FC236}">
+                <a16:creationId xmlns:a16="http://schemas.microsoft.com/office/drawing/2014/main" id="{676B8AC7-CAF8-41C5-8165-E0A7A5390EB0}"/>
+              </a:ext>
+            </a:extLst>
+          </p:cNvPr>
+          <p:cNvGraphicFramePr/>
           <p:nvPr>
-            <p:ph idx="1"/>
+            <p:extLst>
+              <p:ext uri="{D42A27DB-BD31-4B8C-83A1-F6EECF244321}">
+                <p14:modId xmlns:p14="http://schemas.microsoft.com/office/powerpoint/2010/main" val="1656300582"/>
+              </p:ext>
+            </p:extLst>
           </p:nvPr>
-        </p:nvSpPr>
-        <p:spPr>
-          <a:xfrm>
-            <a:off x="838200" y="1825625"/>
-            <a:ext cx="5466347" cy="4351338"/>
-          </a:xfrm>
-        </p:spPr>
-        <p:txBody>
-          <a:bodyPr>
-            <a:normAutofit/>
-          </a:bodyPr>
-          <a:lstStyle/>
-          <a:p>
-            <a:pPr algn="l" fontAlgn="base"/>
-            <a:r>
-              <a:rPr lang="en-US" b="0" i="0" dirty="0" err="1">
-                <a:effectLst/>
-                <a:latin typeface="Inter"/>
-              </a:rPr>
-              <a:t>housing</a:t>
-            </a:r>
-            <a:r>
-              <a:rPr lang="en-US" b="0" i="1" dirty="0" err="1">
-                <a:effectLst/>
-                <a:latin typeface="inherit"/>
-              </a:rPr>
-              <a:t>median</a:t>
-            </a:r>
-            <a:r>
-              <a:rPr lang="en-US" b="0" i="0" dirty="0" err="1">
-                <a:effectLst/>
-                <a:latin typeface="Inter"/>
-              </a:rPr>
-              <a:t>age</a:t>
-            </a:r>
-            <a:endParaRPr lang="en-US" b="0" i="0" dirty="0">
-              <a:effectLst/>
-              <a:latin typeface="Inter"/>
-            </a:endParaRPr>
-          </a:p>
-          <a:p>
-            <a:pPr algn="l" fontAlgn="base"/>
-            <a:r>
-              <a:rPr lang="en-US" b="0" i="0" dirty="0" err="1">
-                <a:effectLst/>
-                <a:latin typeface="Inter"/>
-              </a:rPr>
-              <a:t>total_rooms</a:t>
-            </a:r>
-            <a:r>
-              <a:rPr lang="en-US" b="0" i="0" dirty="0">
-                <a:effectLst/>
-                <a:latin typeface="Inter"/>
-              </a:rPr>
-              <a:t>/avg</a:t>
-            </a:r>
-          </a:p>
-          <a:p>
-            <a:pPr algn="l" fontAlgn="base"/>
-            <a:r>
-              <a:rPr lang="en-US" b="0" i="0" dirty="0" err="1">
-                <a:effectLst/>
-                <a:latin typeface="Inter"/>
-              </a:rPr>
-              <a:t>total_bedrooms</a:t>
-            </a:r>
-            <a:r>
-              <a:rPr lang="en-US" b="0" i="0" dirty="0">
-                <a:effectLst/>
-                <a:latin typeface="Inter"/>
-              </a:rPr>
-              <a:t>/avg</a:t>
-            </a:r>
-          </a:p>
-          <a:p>
-            <a:pPr algn="l" fontAlgn="base"/>
-            <a:r>
-              <a:rPr lang="en-US" b="0" i="0" dirty="0">
-                <a:effectLst/>
-                <a:latin typeface="Inter"/>
-              </a:rPr>
-              <a:t>population</a:t>
-            </a:r>
-          </a:p>
-          <a:p>
-            <a:pPr algn="l" fontAlgn="base"/>
-            <a:r>
-              <a:rPr lang="en-US" b="0" i="0" dirty="0">
-                <a:effectLst/>
-                <a:latin typeface="Inter"/>
-              </a:rPr>
-              <a:t>households</a:t>
-            </a:r>
-          </a:p>
-          <a:p>
-            <a:pPr algn="l" fontAlgn="base"/>
-            <a:r>
-              <a:rPr lang="en-US" b="0" i="0" dirty="0" err="1">
-                <a:effectLst/>
-                <a:latin typeface="Inter"/>
-              </a:rPr>
-              <a:t>median_income</a:t>
-            </a:r>
-            <a:endParaRPr lang="en-US" b="0" i="0" dirty="0">
-              <a:effectLst/>
-              <a:latin typeface="Inter"/>
-            </a:endParaRPr>
-          </a:p>
-          <a:p>
-            <a:pPr algn="l" fontAlgn="base"/>
-            <a:r>
-              <a:rPr lang="en-US" b="0" i="0" dirty="0" err="1">
-                <a:effectLst/>
-                <a:latin typeface="Inter"/>
-              </a:rPr>
-              <a:t>median</a:t>
-            </a:r>
-            <a:r>
-              <a:rPr lang="en-US" b="0" i="1" dirty="0" err="1">
-                <a:effectLst/>
-                <a:latin typeface="inherit"/>
-              </a:rPr>
-              <a:t>house</a:t>
-            </a:r>
-            <a:r>
-              <a:rPr lang="en-US" b="0" i="0" dirty="0" err="1">
-                <a:effectLst/>
-                <a:latin typeface="Inter"/>
-              </a:rPr>
-              <a:t>value</a:t>
-            </a:r>
-            <a:endParaRPr lang="en-US" b="0" i="0" dirty="0">
-              <a:effectLst/>
-              <a:latin typeface="Inter"/>
-            </a:endParaRPr>
-          </a:p>
-          <a:p>
-            <a:pPr algn="l" fontAlgn="base"/>
-            <a:r>
-              <a:rPr lang="en-US" b="0" i="0" dirty="0" err="1">
-                <a:effectLst/>
-                <a:latin typeface="Inter"/>
-              </a:rPr>
-              <a:t>ocean_proximity</a:t>
-            </a:r>
-            <a:endParaRPr lang="en-US" b="0" i="0" dirty="0">
-              <a:effectLst/>
-              <a:latin typeface="Inter"/>
-            </a:endParaRPr>
-          </a:p>
-          <a:p>
-            <a:endParaRPr lang="en-SG" dirty="0"/>
-          </a:p>
-          <a:p>
-            <a:endParaRPr lang="en-SG" dirty="0"/>
-          </a:p>
-          <a:p>
-            <a:endParaRPr lang="en-SG" dirty="0"/>
-          </a:p>
-        </p:txBody>
-      </p:sp>
+        </p:nvGraphicFramePr>
+        <p:xfrm>
+          <a:off x="8002834" y="726538"/>
+          <a:ext cx="3089361" cy="2548256"/>
+        </p:xfrm>
+        <a:graphic>
+          <a:graphicData uri="http://schemas.openxmlformats.org/drawingml/2006/chart">
+            <c:chart xmlns:c="http://schemas.openxmlformats.org/drawingml/2006/chart" xmlns:r="http://schemas.openxmlformats.org/officeDocument/2006/relationships" r:id="rId3"/>
+          </a:graphicData>
+        </a:graphic>
+      </p:graphicFrame>
       <p:pic>
         <p:nvPicPr>
-          <p:cNvPr id="5" name="Picture 4">
-            <a:extLst>
-              <a:ext uri="{FF2B5EF4-FFF2-40B4-BE49-F238E27FC236}">
-                <a16:creationId xmlns:a16="http://schemas.microsoft.com/office/drawing/2014/main" id="{506AD066-E2A2-4B2C-89C1-9C388A89C618}"/>
+          <p:cNvPr id="22" name="Picture 21">
+            <a:extLst>
+              <a:ext uri="{FF2B5EF4-FFF2-40B4-BE49-F238E27FC236}">
+                <a16:creationId xmlns:a16="http://schemas.microsoft.com/office/drawing/2014/main" id="{32E3862A-1079-4745-80AE-1003B9365362}"/>
               </a:ext>
             </a:extLst>
           </p:cNvPr>
@@ -5183,15 +6940,25 @@
           <p:nvPr/>
         </p:nvPicPr>
         <p:blipFill>
-          <a:blip r:embed="rId2"/>
+          <a:blip r:embed="rId4">
+            <a:duotone>
+              <a:prstClr val="black"/>
+              <a:schemeClr val="accent1">
+                <a:lumMod val="40000"/>
+                <a:lumOff val="60000"/>
+                <a:tint val="45000"/>
+                <a:satMod val="400000"/>
+              </a:schemeClr>
+            </a:duotone>
+          </a:blip>
           <a:stretch>
             <a:fillRect/>
           </a:stretch>
         </p:blipFill>
         <p:spPr>
           <a:xfrm>
-            <a:off x="6304547" y="1090863"/>
-            <a:ext cx="5603713" cy="5620312"/>
+            <a:off x="3928519" y="3770886"/>
+            <a:ext cx="3980908" cy="2478662"/>
           </a:xfrm>
           <a:prstGeom prst="rect">
             <a:avLst/>
@@ -5200,321 +6967,20 @@
       </p:pic>
       <p:sp>
         <p:nvSpPr>
-          <p:cNvPr id="6" name="Title 1">
-            <a:extLst>
-              <a:ext uri="{FF2B5EF4-FFF2-40B4-BE49-F238E27FC236}">
-                <a16:creationId xmlns:a16="http://schemas.microsoft.com/office/drawing/2014/main" id="{9D8E703F-3E15-4DBD-AF14-2066314D4D44}"/>
-              </a:ext>
-            </a:extLst>
-          </p:cNvPr>
-          <p:cNvSpPr txBox="1">
-            <a:spLocks/>
-          </p:cNvSpPr>
+          <p:cNvPr id="28" name="TextBox 27">
+            <a:extLst>
+              <a:ext uri="{FF2B5EF4-FFF2-40B4-BE49-F238E27FC236}">
+                <a16:creationId xmlns:a16="http://schemas.microsoft.com/office/drawing/2014/main" id="{6CF1727F-7C28-45CB-8802-13E9E5F479E1}"/>
+              </a:ext>
+            </a:extLst>
+          </p:cNvPr>
+          <p:cNvSpPr txBox="1"/>
           <p:nvPr/>
         </p:nvSpPr>
         <p:spPr>
           <a:xfrm>
-            <a:off x="8757992" y="191106"/>
-            <a:ext cx="3434008" cy="1325563"/>
-          </a:xfrm>
-          <a:prstGeom prst="rect">
-            <a:avLst/>
-          </a:prstGeom>
-        </p:spPr>
-        <p:txBody>
-          <a:bodyPr vert="horz" lIns="91440" tIns="45720" rIns="91440" bIns="45720" rtlCol="0" anchor="ctr">
-            <a:normAutofit/>
-          </a:bodyPr>
-          <a:lstStyle>
-            <a:lvl1pPr algn="l" defTabSz="914400" rtl="0" eaLnBrk="1" latinLnBrk="0" hangingPunct="1">
-              <a:lnSpc>
-                <a:spcPct val="90000"/>
-              </a:lnSpc>
-              <a:spcBef>
-                <a:spcPct val="0"/>
-              </a:spcBef>
-              <a:buNone/>
-              <a:defRPr sz="4400" kern="1200">
-                <a:solidFill>
-                  <a:schemeClr val="tx1"/>
-                </a:solidFill>
-                <a:latin typeface="+mj-lt"/>
-                <a:ea typeface="+mj-ea"/>
-                <a:cs typeface="+mj-cs"/>
-              </a:defRPr>
-            </a:lvl1pPr>
-          </a:lstStyle>
-          <a:p>
-            <a:r>
-              <a:rPr lang="en-US" sz="3200" dirty="0"/>
-              <a:t>Region in California</a:t>
-            </a:r>
-            <a:endParaRPr lang="en-SG" sz="3200" dirty="0"/>
-          </a:p>
-        </p:txBody>
-      </p:sp>
-    </p:spTree>
-    <p:extLst>
-      <p:ext uri="{BB962C8B-B14F-4D97-AF65-F5344CB8AC3E}">
-        <p14:creationId xmlns:p14="http://schemas.microsoft.com/office/powerpoint/2010/main" val="1339129388"/>
-      </p:ext>
-    </p:extLst>
-  </p:cSld>
-  <p:clrMapOvr>
-    <a:masterClrMapping/>
-  </p:clrMapOvr>
-</p:sld>
-</file>
-
-<file path=ppt/slides/slide3.xml><?xml version="1.0" encoding="utf-8"?>
-<p:sld xmlns:a="http://schemas.openxmlformats.org/drawingml/2006/main" xmlns:r="http://schemas.openxmlformats.org/officeDocument/2006/relationships" xmlns:p="http://schemas.openxmlformats.org/presentationml/2006/main">
-  <p:cSld>
-    <p:spTree>
-      <p:nvGrpSpPr>
-        <p:cNvPr id="1" name=""/>
-        <p:cNvGrpSpPr/>
-        <p:nvPr/>
-      </p:nvGrpSpPr>
-      <p:grpSpPr>
-        <a:xfrm>
-          <a:off x="0" y="0"/>
-          <a:ext cx="0" cy="0"/>
-          <a:chOff x="0" y="0"/>
-          <a:chExt cx="0" cy="0"/>
-        </a:xfrm>
-      </p:grpSpPr>
-      <p:sp>
-        <p:nvSpPr>
-          <p:cNvPr id="2" name="Title 1">
-            <a:extLst>
-              <a:ext uri="{FF2B5EF4-FFF2-40B4-BE49-F238E27FC236}">
-                <a16:creationId xmlns:a16="http://schemas.microsoft.com/office/drawing/2014/main" id="{F1E5F8CD-B0C3-462F-B956-6FE8ACD678F5}"/>
-              </a:ext>
-            </a:extLst>
-          </p:cNvPr>
-          <p:cNvSpPr>
-            <a:spLocks noGrp="1"/>
-          </p:cNvSpPr>
-          <p:nvPr>
-            <p:ph type="title"/>
-          </p:nvPr>
-        </p:nvSpPr>
-        <p:spPr/>
-        <p:txBody>
-          <a:bodyPr/>
-          <a:lstStyle/>
-          <a:p>
-            <a:r>
-              <a:rPr lang="en-US" dirty="0"/>
-              <a:t>List of variables</a:t>
-            </a:r>
-            <a:endParaRPr lang="en-SG" dirty="0"/>
-          </a:p>
-        </p:txBody>
-      </p:sp>
-      <p:sp>
-        <p:nvSpPr>
-          <p:cNvPr id="3" name="Content Placeholder 2">
-            <a:extLst>
-              <a:ext uri="{FF2B5EF4-FFF2-40B4-BE49-F238E27FC236}">
-                <a16:creationId xmlns:a16="http://schemas.microsoft.com/office/drawing/2014/main" id="{27869ABA-D62F-461D-97D5-4C9AB69208B9}"/>
-              </a:ext>
-            </a:extLst>
-          </p:cNvPr>
-          <p:cNvSpPr>
-            <a:spLocks noGrp="1"/>
-          </p:cNvSpPr>
-          <p:nvPr>
-            <p:ph idx="1"/>
-          </p:nvPr>
-        </p:nvSpPr>
-        <p:spPr>
-          <a:xfrm>
-            <a:off x="838200" y="1825625"/>
-            <a:ext cx="10515600" cy="4351338"/>
-          </a:xfrm>
-        </p:spPr>
-        <p:txBody>
-          <a:bodyPr>
-            <a:normAutofit fontScale="92500" lnSpcReduction="20000"/>
-          </a:bodyPr>
-          <a:lstStyle/>
-          <a:p>
-            <a:pPr algn="l" fontAlgn="base"/>
-            <a:r>
-              <a:rPr lang="en-US" b="0" i="0" dirty="0">
-                <a:effectLst/>
-                <a:latin typeface="Inter"/>
-              </a:rPr>
-              <a:t>longitude</a:t>
-            </a:r>
-          </a:p>
-          <a:p>
-            <a:pPr algn="l" fontAlgn="base"/>
-            <a:r>
-              <a:rPr lang="en-US" b="0" i="0" dirty="0">
-                <a:effectLst/>
-                <a:latin typeface="Inter"/>
-              </a:rPr>
-              <a:t>latitude</a:t>
-            </a:r>
-          </a:p>
-          <a:p>
-            <a:pPr algn="l" fontAlgn="base"/>
-            <a:r>
-              <a:rPr lang="en-US" b="0" i="0" dirty="0" err="1">
-                <a:effectLst/>
-                <a:latin typeface="Inter"/>
-              </a:rPr>
-              <a:t>housing</a:t>
-            </a:r>
-            <a:r>
-              <a:rPr lang="en-US" b="0" i="1" dirty="0" err="1">
-                <a:effectLst/>
-                <a:latin typeface="inherit"/>
-              </a:rPr>
-              <a:t>median</a:t>
-            </a:r>
-            <a:r>
-              <a:rPr lang="en-US" b="0" i="0" dirty="0" err="1">
-                <a:effectLst/>
-                <a:latin typeface="Inter"/>
-              </a:rPr>
-              <a:t>age</a:t>
-            </a:r>
-            <a:endParaRPr lang="en-US" b="0" i="0" dirty="0">
-              <a:effectLst/>
-              <a:latin typeface="Inter"/>
-            </a:endParaRPr>
-          </a:p>
-          <a:p>
-            <a:pPr algn="l" fontAlgn="base"/>
-            <a:r>
-              <a:rPr lang="en-US" b="0" i="0" dirty="0" err="1">
-                <a:effectLst/>
-                <a:latin typeface="Inter"/>
-              </a:rPr>
-              <a:t>total_rooms</a:t>
-            </a:r>
-            <a:endParaRPr lang="en-US" b="0" i="0" dirty="0">
-              <a:effectLst/>
-              <a:latin typeface="Inter"/>
-            </a:endParaRPr>
-          </a:p>
-          <a:p>
-            <a:pPr algn="l" fontAlgn="base"/>
-            <a:r>
-              <a:rPr lang="en-US" b="0" i="0" dirty="0" err="1">
-                <a:effectLst/>
-                <a:latin typeface="Inter"/>
-              </a:rPr>
-              <a:t>total_bedrooms</a:t>
-            </a:r>
-            <a:endParaRPr lang="en-US" b="0" i="0" dirty="0">
-              <a:effectLst/>
-              <a:latin typeface="Inter"/>
-            </a:endParaRPr>
-          </a:p>
-          <a:p>
-            <a:pPr algn="l" fontAlgn="base"/>
-            <a:r>
-              <a:rPr lang="en-US" b="0" i="0" dirty="0">
-                <a:effectLst/>
-                <a:latin typeface="Inter"/>
-              </a:rPr>
-              <a:t>population</a:t>
-            </a:r>
-          </a:p>
-          <a:p>
-            <a:pPr algn="l" fontAlgn="base"/>
-            <a:r>
-              <a:rPr lang="en-US" b="0" i="0" dirty="0">
-                <a:effectLst/>
-                <a:latin typeface="Inter"/>
-              </a:rPr>
-              <a:t>households</a:t>
-            </a:r>
-          </a:p>
-          <a:p>
-            <a:pPr algn="l" fontAlgn="base"/>
-            <a:r>
-              <a:rPr lang="en-US" b="0" i="0" dirty="0" err="1">
-                <a:effectLst/>
-                <a:latin typeface="Inter"/>
-              </a:rPr>
-              <a:t>median_income</a:t>
-            </a:r>
-            <a:endParaRPr lang="en-US" b="0" i="0" dirty="0">
-              <a:effectLst/>
-              <a:latin typeface="Inter"/>
-            </a:endParaRPr>
-          </a:p>
-          <a:p>
-            <a:pPr algn="l" fontAlgn="base"/>
-            <a:r>
-              <a:rPr lang="en-US" b="0" i="0" dirty="0" err="1">
-                <a:effectLst/>
-                <a:latin typeface="Inter"/>
-              </a:rPr>
-              <a:t>median</a:t>
-            </a:r>
-            <a:r>
-              <a:rPr lang="en-US" b="0" i="1" dirty="0" err="1">
-                <a:effectLst/>
-                <a:latin typeface="inherit"/>
-              </a:rPr>
-              <a:t>house</a:t>
-            </a:r>
-            <a:r>
-              <a:rPr lang="en-US" b="0" i="0" dirty="0" err="1">
-                <a:effectLst/>
-                <a:latin typeface="Inter"/>
-              </a:rPr>
-              <a:t>value</a:t>
-            </a:r>
-            <a:endParaRPr lang="en-US" b="0" i="0" dirty="0">
-              <a:effectLst/>
-              <a:latin typeface="Inter"/>
-            </a:endParaRPr>
-          </a:p>
-          <a:p>
-            <a:pPr algn="l" fontAlgn="base"/>
-            <a:r>
-              <a:rPr lang="en-US" b="0" i="0" dirty="0" err="1">
-                <a:effectLst/>
-                <a:latin typeface="Inter"/>
-              </a:rPr>
-              <a:t>ocean_proximity</a:t>
-            </a:r>
-            <a:endParaRPr lang="en-US" b="0" i="0" dirty="0">
-              <a:effectLst/>
-              <a:latin typeface="Inter"/>
-            </a:endParaRPr>
-          </a:p>
-          <a:p>
-            <a:endParaRPr lang="en-SG" dirty="0"/>
-          </a:p>
-          <a:p>
-            <a:endParaRPr lang="en-SG" dirty="0"/>
-          </a:p>
-        </p:txBody>
-      </p:sp>
-      <p:sp>
-        <p:nvSpPr>
-          <p:cNvPr id="7" name="TextBox 6">
-            <a:extLst>
-              <a:ext uri="{FF2B5EF4-FFF2-40B4-BE49-F238E27FC236}">
-                <a16:creationId xmlns:a16="http://schemas.microsoft.com/office/drawing/2014/main" id="{E0A5AF2E-0AA7-4867-B664-2B45BCAB2529}"/>
-              </a:ext>
-            </a:extLst>
-          </p:cNvPr>
-          <p:cNvSpPr txBox="1"/>
-          <p:nvPr/>
-        </p:nvSpPr>
-        <p:spPr>
-          <a:xfrm>
-            <a:off x="6545178" y="365125"/>
-            <a:ext cx="6096000" cy="6463308"/>
+            <a:off x="3859626" y="3420662"/>
+            <a:ext cx="3342786" cy="369332"/>
           </a:xfrm>
           <a:prstGeom prst="rect">
             <a:avLst/>
@@ -5522,267 +6988,313 @@
           <a:noFill/>
         </p:spPr>
         <p:txBody>
-          <a:bodyPr wrap="square">
+          <a:bodyPr wrap="square" rtlCol="0">
             <a:spAutoFit/>
           </a:bodyPr>
           <a:lstStyle/>
           <a:p>
-            <a:pPr algn="l" fontAlgn="base"/>
-            <a:r>
-              <a:rPr lang="en-US" b="0" i="0" dirty="0">
-                <a:effectLst/>
-                <a:latin typeface="Inter"/>
+            <a:r>
+              <a:rPr lang="en-US" dirty="0">
+                <a:latin typeface="Arial Nova Light" panose="020B0304020202020204" pitchFamily="34" charset="0"/>
               </a:rPr>
-              <a:t>* Location</a:t>
-            </a:r>
-          </a:p>
-          <a:p>
-            <a:pPr algn="l" fontAlgn="base"/>
-            <a:r>
-              <a:rPr lang="en-US" b="0" i="0" dirty="0">
-                <a:effectLst/>
-                <a:latin typeface="Inter"/>
+              <a:t>Vote average by studios</a:t>
+            </a:r>
+            <a:endParaRPr lang="en-SG" dirty="0">
+              <a:latin typeface="Arial Nova Light" panose="020B0304020202020204" pitchFamily="34" charset="0"/>
+            </a:endParaRPr>
+          </a:p>
+        </p:txBody>
+      </p:sp>
+      <p:sp>
+        <p:nvSpPr>
+          <p:cNvPr id="32" name="Rectangle 31">
+            <a:extLst>
+              <a:ext uri="{FF2B5EF4-FFF2-40B4-BE49-F238E27FC236}">
+                <a16:creationId xmlns:a16="http://schemas.microsoft.com/office/drawing/2014/main" id="{B92076F0-AC43-47A0-88DB-E7D9F26D3BAF}"/>
+              </a:ext>
+            </a:extLst>
+          </p:cNvPr>
+          <p:cNvSpPr/>
+          <p:nvPr/>
+        </p:nvSpPr>
+        <p:spPr>
+          <a:xfrm>
+            <a:off x="7942363" y="440093"/>
+            <a:ext cx="3310121" cy="2791779"/>
+          </a:xfrm>
+          <a:prstGeom prst="rect">
+            <a:avLst/>
+          </a:prstGeom>
+          <a:noFill/>
+        </p:spPr>
+        <p:style>
+          <a:lnRef idx="2">
+            <a:schemeClr val="accent1">
+              <a:shade val="50000"/>
+            </a:schemeClr>
+          </a:lnRef>
+          <a:fillRef idx="1">
+            <a:schemeClr val="accent1"/>
+          </a:fillRef>
+          <a:effectRef idx="0">
+            <a:schemeClr val="accent1"/>
+          </a:effectRef>
+          <a:fontRef idx="minor">
+            <a:schemeClr val="lt1"/>
+          </a:fontRef>
+        </p:style>
+        <p:txBody>
+          <a:bodyPr rtlCol="0" anchor="ctr"/>
+          <a:lstStyle/>
+          <a:p>
+            <a:pPr algn="ctr"/>
+            <a:endParaRPr lang="en-SG"/>
+          </a:p>
+        </p:txBody>
+      </p:sp>
+      <p:sp>
+        <p:nvSpPr>
+          <p:cNvPr id="34" name="TextBox 33">
+            <a:extLst>
+              <a:ext uri="{FF2B5EF4-FFF2-40B4-BE49-F238E27FC236}">
+                <a16:creationId xmlns:a16="http://schemas.microsoft.com/office/drawing/2014/main" id="{004717A1-0832-4E69-94F3-E27B283CA2E6}"/>
+              </a:ext>
+            </a:extLst>
+          </p:cNvPr>
+          <p:cNvSpPr txBox="1"/>
+          <p:nvPr/>
+        </p:nvSpPr>
+        <p:spPr>
+          <a:xfrm>
+            <a:off x="260181" y="3400647"/>
+            <a:ext cx="1812175" cy="369332"/>
+          </a:xfrm>
+          <a:prstGeom prst="rect">
+            <a:avLst/>
+          </a:prstGeom>
+          <a:noFill/>
+        </p:spPr>
+        <p:txBody>
+          <a:bodyPr wrap="square" rtlCol="0">
+            <a:spAutoFit/>
+          </a:bodyPr>
+          <a:lstStyle/>
+          <a:p>
+            <a:r>
+              <a:rPr lang="en-US" b="1" dirty="0">
+                <a:latin typeface="MV Boli" panose="02000500030200090000" pitchFamily="2" charset="0"/>
+                <a:cs typeface="MV Boli" panose="02000500030200090000" pitchFamily="2" charset="0"/>
               </a:rPr>
-              <a:t>longitude</a:t>
-            </a:r>
-          </a:p>
-          <a:p>
-            <a:pPr algn="l" fontAlgn="base"/>
-            <a:r>
-              <a:rPr lang="en-US" b="0" i="0" dirty="0">
-                <a:effectLst/>
-                <a:latin typeface="Inter"/>
+              <a:t>S</a:t>
+            </a:r>
+            <a:r>
+              <a:rPr lang="en-SG" b="1" dirty="0">
+                <a:latin typeface="MV Boli" panose="02000500030200090000" pitchFamily="2" charset="0"/>
+                <a:cs typeface="MV Boli" panose="02000500030200090000" pitchFamily="2" charset="0"/>
               </a:rPr>
-              <a:t>Latitude</a:t>
-            </a:r>
-          </a:p>
-          <a:p>
-            <a:pPr algn="l" fontAlgn="base"/>
-            <a:endParaRPr lang="en-US" b="0" i="0" dirty="0">
-              <a:effectLst/>
-              <a:latin typeface="Inter"/>
+              <a:t>LIDER</a:t>
+            </a:r>
+          </a:p>
+        </p:txBody>
+      </p:sp>
+      <p:cxnSp>
+        <p:nvCxnSpPr>
+          <p:cNvPr id="35" name="Straight Arrow Connector 34">
+            <a:extLst>
+              <a:ext uri="{FF2B5EF4-FFF2-40B4-BE49-F238E27FC236}">
+                <a16:creationId xmlns:a16="http://schemas.microsoft.com/office/drawing/2014/main" id="{4FC74C08-5D62-4E29-9D81-2574AB23BAB1}"/>
+              </a:ext>
+            </a:extLst>
+          </p:cNvPr>
+          <p:cNvCxnSpPr>
+            <a:cxnSpLocks/>
+          </p:cNvCxnSpPr>
+          <p:nvPr/>
+        </p:nvCxnSpPr>
+        <p:spPr>
+          <a:xfrm>
+            <a:off x="1242367" y="3612858"/>
+            <a:ext cx="440574" cy="258124"/>
+          </a:xfrm>
+          <a:prstGeom prst="straightConnector1">
+            <a:avLst/>
+          </a:prstGeom>
+          <a:ln>
+            <a:prstDash val="dash"/>
+            <a:tailEnd type="triangle"/>
+          </a:ln>
+        </p:spPr>
+        <p:style>
+          <a:lnRef idx="3">
+            <a:schemeClr val="dk1"/>
+          </a:lnRef>
+          <a:fillRef idx="0">
+            <a:schemeClr val="dk1"/>
+          </a:fillRef>
+          <a:effectRef idx="2">
+            <a:schemeClr val="dk1"/>
+          </a:effectRef>
+          <a:fontRef idx="minor">
+            <a:schemeClr val="tx1"/>
+          </a:fontRef>
+        </p:style>
+      </p:cxnSp>
+      <p:sp>
+        <p:nvSpPr>
+          <p:cNvPr id="41" name="TextBox 40">
+            <a:extLst>
+              <a:ext uri="{FF2B5EF4-FFF2-40B4-BE49-F238E27FC236}">
+                <a16:creationId xmlns:a16="http://schemas.microsoft.com/office/drawing/2014/main" id="{2E0F1CE7-EA00-4E61-8DF0-50363BEEA405}"/>
+              </a:ext>
+            </a:extLst>
+          </p:cNvPr>
+          <p:cNvSpPr txBox="1"/>
+          <p:nvPr/>
+        </p:nvSpPr>
+        <p:spPr>
+          <a:xfrm>
+            <a:off x="8028716" y="3472640"/>
+            <a:ext cx="3342786" cy="369332"/>
+          </a:xfrm>
+          <a:prstGeom prst="rect">
+            <a:avLst/>
+          </a:prstGeom>
+          <a:noFill/>
+        </p:spPr>
+        <p:txBody>
+          <a:bodyPr wrap="square" rtlCol="0">
+            <a:spAutoFit/>
+          </a:bodyPr>
+          <a:lstStyle/>
+          <a:p>
+            <a:r>
+              <a:rPr lang="en-US" dirty="0">
+                <a:latin typeface="Arial Nova Light" panose="020B0304020202020204" pitchFamily="34" charset="0"/>
+              </a:rPr>
+              <a:t>Top 10 movies</a:t>
+            </a:r>
+            <a:endParaRPr lang="en-SG" dirty="0">
+              <a:latin typeface="Arial Nova Light" panose="020B0304020202020204" pitchFamily="34" charset="0"/>
             </a:endParaRPr>
           </a:p>
-          <a:p>
-            <a:pPr fontAlgn="base"/>
-            <a:r>
-              <a:rPr lang="en-US" b="0" i="0" dirty="0" err="1">
-                <a:effectLst/>
-                <a:latin typeface="Inter"/>
+        </p:txBody>
+      </p:sp>
+      <p:sp>
+        <p:nvSpPr>
+          <p:cNvPr id="44" name="Flowchart: Process 43">
+            <a:extLst>
+              <a:ext uri="{FF2B5EF4-FFF2-40B4-BE49-F238E27FC236}">
+                <a16:creationId xmlns:a16="http://schemas.microsoft.com/office/drawing/2014/main" id="{3DF0C67D-7A60-4D1F-BF2D-EE0ACC529B7E}"/>
+              </a:ext>
+            </a:extLst>
+          </p:cNvPr>
+          <p:cNvSpPr/>
+          <p:nvPr/>
+        </p:nvSpPr>
+        <p:spPr>
+          <a:xfrm>
+            <a:off x="8924766" y="3281820"/>
+            <a:ext cx="2278249" cy="225656"/>
+          </a:xfrm>
+          <a:prstGeom prst="flowChartProcess">
+            <a:avLst/>
+          </a:prstGeom>
+          <a:noFill/>
+          <a:ln w="28575">
+            <a:solidFill>
+              <a:schemeClr val="bg2">
+                <a:lumMod val="75000"/>
+              </a:schemeClr>
+            </a:solidFill>
+          </a:ln>
+        </p:spPr>
+        <p:style>
+          <a:lnRef idx="2">
+            <a:schemeClr val="accent1">
+              <a:shade val="50000"/>
+            </a:schemeClr>
+          </a:lnRef>
+          <a:fillRef idx="1">
+            <a:schemeClr val="accent1"/>
+          </a:fillRef>
+          <a:effectRef idx="0">
+            <a:schemeClr val="accent1"/>
+          </a:effectRef>
+          <a:fontRef idx="minor">
+            <a:schemeClr val="lt1"/>
+          </a:fontRef>
+        </p:style>
+        <p:txBody>
+          <a:bodyPr rtlCol="0" anchor="ctr"/>
+          <a:lstStyle/>
+          <a:p>
+            <a:r>
+              <a:rPr lang="en-US" sz="1200" dirty="0">
+                <a:solidFill>
+                  <a:schemeClr val="tx1"/>
+                </a:solidFill>
+                <a:latin typeface="Arial Nova Light" panose="020B0304020202020204" pitchFamily="34" charset="0"/>
               </a:rPr>
-              <a:t>ocean_proximity</a:t>
-            </a:r>
-            <a:endParaRPr lang="en-US" b="0" i="0" dirty="0">
-              <a:effectLst/>
-              <a:latin typeface="Inter"/>
+              <a:t>Sort: by vote average, profit</a:t>
+            </a:r>
+            <a:endParaRPr lang="en-SG" sz="1200" dirty="0">
+              <a:solidFill>
+                <a:schemeClr val="tx1"/>
+              </a:solidFill>
+              <a:latin typeface="Arial Nova Light" panose="020B0304020202020204" pitchFamily="34" charset="0"/>
             </a:endParaRPr>
           </a:p>
-          <a:p>
-            <a:pPr algn="l" fontAlgn="base"/>
-            <a:endParaRPr lang="en-US" dirty="0">
-              <a:latin typeface="Inter"/>
-            </a:endParaRPr>
-          </a:p>
-          <a:p>
-            <a:pPr algn="l" fontAlgn="base"/>
-            <a:r>
-              <a:rPr lang="en-US" b="0" i="0" dirty="0">
-                <a:effectLst/>
-                <a:latin typeface="Inter"/>
-              </a:rPr>
-              <a:t>* Building age</a:t>
-            </a:r>
-          </a:p>
-          <a:p>
-            <a:pPr algn="l" fontAlgn="base"/>
-            <a:r>
-              <a:rPr lang="en-US" b="0" i="0" dirty="0" err="1">
-                <a:effectLst/>
-                <a:latin typeface="Inter"/>
-              </a:rPr>
-              <a:t>housing</a:t>
-            </a:r>
-            <a:r>
-              <a:rPr lang="en-US" b="0" i="1" dirty="0" err="1">
-                <a:effectLst/>
-                <a:latin typeface="inherit"/>
-              </a:rPr>
-              <a:t>median</a:t>
-            </a:r>
-            <a:r>
-              <a:rPr lang="en-US" b="0" i="0" dirty="0" err="1">
-                <a:effectLst/>
-                <a:latin typeface="Inter"/>
-              </a:rPr>
-              <a:t>age</a:t>
-            </a:r>
-            <a:endParaRPr lang="en-US" b="0" i="0" dirty="0">
-              <a:effectLst/>
-              <a:latin typeface="Inter"/>
-            </a:endParaRPr>
-          </a:p>
-          <a:p>
-            <a:pPr algn="l" fontAlgn="base"/>
-            <a:r>
-              <a:rPr lang="en-US" dirty="0">
-                <a:latin typeface="Inter"/>
-              </a:rPr>
-              <a:t>* Rooms</a:t>
-            </a:r>
-          </a:p>
-          <a:p>
-            <a:pPr algn="l" fontAlgn="base"/>
-            <a:r>
-              <a:rPr lang="en-US" b="0" i="0" dirty="0" err="1">
-                <a:effectLst/>
-                <a:latin typeface="Inter"/>
-              </a:rPr>
-              <a:t>total_rooms</a:t>
-            </a:r>
-            <a:endParaRPr lang="en-US" b="0" i="0" dirty="0">
-              <a:effectLst/>
-              <a:latin typeface="Inter"/>
-            </a:endParaRPr>
-          </a:p>
-          <a:p>
-            <a:pPr algn="l" fontAlgn="base"/>
-            <a:r>
-              <a:rPr lang="en-US" b="0" i="0" dirty="0" err="1">
-                <a:effectLst/>
-                <a:latin typeface="Inter"/>
-              </a:rPr>
-              <a:t>total_bedrooms</a:t>
-            </a:r>
-            <a:endParaRPr lang="en-US" b="0" i="0" dirty="0">
-              <a:effectLst/>
-              <a:latin typeface="Inter"/>
-            </a:endParaRPr>
-          </a:p>
-          <a:p>
-            <a:pPr algn="l" fontAlgn="base"/>
-            <a:endParaRPr lang="en-US" dirty="0">
-              <a:latin typeface="Inter"/>
-            </a:endParaRPr>
-          </a:p>
-          <a:p>
-            <a:pPr algn="l" fontAlgn="base"/>
-            <a:r>
-              <a:rPr lang="en-US" b="0" i="0" dirty="0">
-                <a:effectLst/>
-                <a:latin typeface="Inter"/>
-              </a:rPr>
-              <a:t>* Demography</a:t>
-            </a:r>
-          </a:p>
-          <a:p>
-            <a:pPr algn="l" fontAlgn="base"/>
-            <a:r>
-              <a:rPr lang="en-US" b="0" i="0" dirty="0">
-                <a:effectLst/>
-                <a:latin typeface="Inter"/>
-              </a:rPr>
-              <a:t>population</a:t>
-            </a:r>
-          </a:p>
-          <a:p>
-            <a:pPr algn="l" fontAlgn="base"/>
-            <a:r>
-              <a:rPr lang="en-US" b="0" i="0" dirty="0">
-                <a:effectLst/>
-                <a:latin typeface="Inter"/>
-              </a:rPr>
-              <a:t>Households</a:t>
-            </a:r>
-          </a:p>
-          <a:p>
-            <a:pPr algn="l" fontAlgn="base"/>
-            <a:endParaRPr lang="en-US" dirty="0">
-              <a:latin typeface="Inter"/>
-            </a:endParaRPr>
-          </a:p>
-          <a:p>
-            <a:pPr algn="l" fontAlgn="base"/>
-            <a:r>
-              <a:rPr lang="en-US" b="0" i="0" dirty="0">
-                <a:effectLst/>
-                <a:latin typeface="Inter"/>
-              </a:rPr>
-              <a:t>*Income</a:t>
-            </a:r>
-          </a:p>
-          <a:p>
-            <a:pPr algn="l" fontAlgn="base"/>
-            <a:r>
-              <a:rPr lang="en-US" b="0" i="0" dirty="0" err="1">
-                <a:effectLst/>
-                <a:latin typeface="Inter"/>
-              </a:rPr>
-              <a:t>median_income</a:t>
-            </a:r>
-            <a:endParaRPr lang="en-US" b="0" i="0" dirty="0">
-              <a:effectLst/>
-              <a:latin typeface="Inter"/>
-            </a:endParaRPr>
-          </a:p>
-          <a:p>
-            <a:pPr algn="l" fontAlgn="base"/>
-            <a:endParaRPr lang="en-US" dirty="0">
-              <a:latin typeface="Inter"/>
-            </a:endParaRPr>
-          </a:p>
-          <a:p>
-            <a:pPr algn="l" fontAlgn="base"/>
-            <a:r>
-              <a:rPr lang="en-US" b="0" i="0" dirty="0" err="1">
-                <a:effectLst/>
-                <a:latin typeface="Inter"/>
-              </a:rPr>
-              <a:t>median</a:t>
-            </a:r>
-            <a:r>
-              <a:rPr lang="en-US" b="0" i="1" dirty="0" err="1">
-                <a:effectLst/>
-                <a:latin typeface="inherit"/>
-              </a:rPr>
-              <a:t>house</a:t>
-            </a:r>
-            <a:r>
-              <a:rPr lang="en-US" b="0" i="0" dirty="0" err="1">
-                <a:effectLst/>
-                <a:latin typeface="Inter"/>
-              </a:rPr>
-              <a:t>value</a:t>
-            </a:r>
-            <a:endParaRPr lang="en-US" b="0" i="0" dirty="0">
-              <a:effectLst/>
-              <a:latin typeface="Inter"/>
-            </a:endParaRPr>
-          </a:p>
-          <a:p>
-            <a:pPr algn="l" fontAlgn="base"/>
-            <a:endParaRPr lang="en-US" dirty="0">
-              <a:latin typeface="Inter"/>
-            </a:endParaRPr>
-          </a:p>
-          <a:p>
-            <a:pPr algn="l" fontAlgn="base"/>
-            <a:r>
-              <a:rPr lang="en-US" b="0" i="0" dirty="0">
-                <a:effectLst/>
-                <a:latin typeface="Inter"/>
-              </a:rPr>
-              <a:t>Derived: county</a:t>
-            </a:r>
-          </a:p>
-          <a:p>
-            <a:endParaRPr lang="en-SG" dirty="0"/>
+        </p:txBody>
+      </p:sp>
+      <p:sp>
+        <p:nvSpPr>
+          <p:cNvPr id="46" name="Action Button: Go Back or Previous 45">
+            <a:hlinkClick r:id="" action="ppaction://hlinkshowjump?jump=previousslide" highlightClick="1"/>
+            <a:extLst>
+              <a:ext uri="{FF2B5EF4-FFF2-40B4-BE49-F238E27FC236}">
+                <a16:creationId xmlns:a16="http://schemas.microsoft.com/office/drawing/2014/main" id="{7902E04C-EB7C-4E64-81E1-3EDE1109B617}"/>
+              </a:ext>
+            </a:extLst>
+          </p:cNvPr>
+          <p:cNvSpPr/>
+          <p:nvPr/>
+        </p:nvSpPr>
+        <p:spPr>
+          <a:xfrm rot="16200000">
+            <a:off x="10950833" y="3233342"/>
+            <a:ext cx="184495" cy="322538"/>
+          </a:xfrm>
+          <a:prstGeom prst="actionButtonBackPrevious">
+            <a:avLst/>
+          </a:prstGeom>
+        </p:spPr>
+        <p:style>
+          <a:lnRef idx="1">
+            <a:schemeClr val="accent3"/>
+          </a:lnRef>
+          <a:fillRef idx="2">
+            <a:schemeClr val="accent3"/>
+          </a:fillRef>
+          <a:effectRef idx="1">
+            <a:schemeClr val="accent3"/>
+          </a:effectRef>
+          <a:fontRef idx="minor">
+            <a:schemeClr val="dk1"/>
+          </a:fontRef>
+        </p:style>
+        <p:txBody>
+          <a:bodyPr rtlCol="0" anchor="ctr"/>
+          <a:lstStyle/>
+          <a:p>
+            <a:pPr algn="ctr"/>
+            <a:endParaRPr lang="en-SG"/>
           </a:p>
         </p:txBody>
       </p:sp>
     </p:spTree>
     <p:extLst>
       <p:ext uri="{BB962C8B-B14F-4D97-AF65-F5344CB8AC3E}">
-        <p14:creationId xmlns:p14="http://schemas.microsoft.com/office/powerpoint/2010/main" val="592680039"/>
+        <p14:creationId xmlns:p14="http://schemas.microsoft.com/office/powerpoint/2010/main" val="1911770299"/>
       </p:ext>
     </p:extLst>
   </p:cSld>

</xml_diff>